<commit_message>
Zosma list categories (#108)
* update ui

* refactor

* update external spec

* create category dialog

* add external spec for category dialog

* update interface.jpg

* add boot sequence to uml

* add autonumber

* add dialog to class.uml

* update sequence dialog

* add class description

* update sequence description
</commit_message>
<xml_diff>
--- a/bin/zosma.pptx
+++ b/bin/zosma.pptx
@@ -5,11 +5,12 @@
     <p:sldMasterId id="2147483648" r:id="rId1"/>
   </p:sldMasterIdLst>
   <p:notesMasterIdLst>
-    <p:notesMasterId r:id="rId4"/>
+    <p:notesMasterId r:id="rId5"/>
   </p:notesMasterIdLst>
   <p:sldIdLst>
     <p:sldId id="256" r:id="rId2"/>
     <p:sldId id="257" r:id="rId3"/>
+    <p:sldId id="259" r:id="rId4"/>
   </p:sldIdLst>
   <p:sldSz cx="9144000" cy="6858000" type="screen4x3"/>
   <p:notesSz cx="6858000" cy="9144000"/>
@@ -193,7 +194,7 @@
           <a:p>
             <a:fld id="{EE82FEE5-269B-9B49-A8C4-823C45BE6055}" type="datetimeFigureOut">
               <a:rPr kumimoji="1" lang="ja-JP" altLang="en-US" smtClean="0"/>
-              <a:t>16/09/17</a:t>
+              <a:t>17/05/08</a:t>
             </a:fld>
             <a:endParaRPr kumimoji="1" lang="ja-JP" altLang="en-US"/>
           </a:p>
@@ -674,7 +675,7 @@
           <a:p>
             <a:fld id="{3ABA01A1-4899-9944-833D-6A66CDE659CB}" type="datetimeFigureOut">
               <a:rPr kumimoji="1" lang="ja-JP" altLang="en-US" smtClean="0"/>
-              <a:t>16/09/17</a:t>
+              <a:t>17/05/08</a:t>
             </a:fld>
             <a:endParaRPr kumimoji="1" lang="ja-JP" altLang="en-US"/>
           </a:p>
@@ -876,7 +877,7 @@
           <a:p>
             <a:fld id="{3ABA01A1-4899-9944-833D-6A66CDE659CB}" type="datetimeFigureOut">
               <a:rPr kumimoji="1" lang="ja-JP" altLang="en-US" smtClean="0"/>
-              <a:t>16/09/17</a:t>
+              <a:t>17/05/08</a:t>
             </a:fld>
             <a:endParaRPr kumimoji="1" lang="ja-JP" altLang="en-US"/>
           </a:p>
@@ -1088,7 +1089,7 @@
           <a:p>
             <a:fld id="{3ABA01A1-4899-9944-833D-6A66CDE659CB}" type="datetimeFigureOut">
               <a:rPr kumimoji="1" lang="ja-JP" altLang="en-US" smtClean="0"/>
-              <a:t>16/09/17</a:t>
+              <a:t>17/05/08</a:t>
             </a:fld>
             <a:endParaRPr kumimoji="1" lang="ja-JP" altLang="en-US"/>
           </a:p>
@@ -1290,7 +1291,7 @@
           <a:p>
             <a:fld id="{3ABA01A1-4899-9944-833D-6A66CDE659CB}" type="datetimeFigureOut">
               <a:rPr kumimoji="1" lang="ja-JP" altLang="en-US" smtClean="0"/>
-              <a:t>16/09/17</a:t>
+              <a:t>17/05/08</a:t>
             </a:fld>
             <a:endParaRPr kumimoji="1" lang="ja-JP" altLang="en-US"/>
           </a:p>
@@ -1536,7 +1537,7 @@
           <a:p>
             <a:fld id="{3ABA01A1-4899-9944-833D-6A66CDE659CB}" type="datetimeFigureOut">
               <a:rPr kumimoji="1" lang="ja-JP" altLang="en-US" smtClean="0"/>
-              <a:t>16/09/17</a:t>
+              <a:t>17/05/08</a:t>
             </a:fld>
             <a:endParaRPr kumimoji="1" lang="ja-JP" altLang="en-US"/>
           </a:p>
@@ -1888,7 +1889,7 @@
           <a:p>
             <a:fld id="{3ABA01A1-4899-9944-833D-6A66CDE659CB}" type="datetimeFigureOut">
               <a:rPr kumimoji="1" lang="ja-JP" altLang="en-US" smtClean="0"/>
-              <a:t>16/09/17</a:t>
+              <a:t>17/05/08</a:t>
             </a:fld>
             <a:endParaRPr kumimoji="1" lang="ja-JP" altLang="en-US"/>
           </a:p>
@@ -2374,7 +2375,7 @@
           <a:p>
             <a:fld id="{3ABA01A1-4899-9944-833D-6A66CDE659CB}" type="datetimeFigureOut">
               <a:rPr kumimoji="1" lang="ja-JP" altLang="en-US" smtClean="0"/>
-              <a:t>16/09/17</a:t>
+              <a:t>17/05/08</a:t>
             </a:fld>
             <a:endParaRPr kumimoji="1" lang="ja-JP" altLang="en-US"/>
           </a:p>
@@ -2492,7 +2493,7 @@
           <a:p>
             <a:fld id="{3ABA01A1-4899-9944-833D-6A66CDE659CB}" type="datetimeFigureOut">
               <a:rPr kumimoji="1" lang="ja-JP" altLang="en-US" smtClean="0"/>
-              <a:t>16/09/17</a:t>
+              <a:t>17/05/08</a:t>
             </a:fld>
             <a:endParaRPr kumimoji="1" lang="ja-JP" altLang="en-US"/>
           </a:p>
@@ -2587,7 +2588,7 @@
           <a:p>
             <a:fld id="{3ABA01A1-4899-9944-833D-6A66CDE659CB}" type="datetimeFigureOut">
               <a:rPr kumimoji="1" lang="ja-JP" altLang="en-US" smtClean="0"/>
-              <a:t>16/09/17</a:t>
+              <a:t>17/05/08</a:t>
             </a:fld>
             <a:endParaRPr kumimoji="1" lang="ja-JP" altLang="en-US"/>
           </a:p>
@@ -2896,7 +2897,7 @@
           <a:p>
             <a:fld id="{3ABA01A1-4899-9944-833D-6A66CDE659CB}" type="datetimeFigureOut">
               <a:rPr kumimoji="1" lang="ja-JP" altLang="en-US" smtClean="0"/>
-              <a:t>16/09/17</a:t>
+              <a:t>17/05/08</a:t>
             </a:fld>
             <a:endParaRPr kumimoji="1" lang="ja-JP" altLang="en-US"/>
           </a:p>
@@ -3149,7 +3150,7 @@
           <a:p>
             <a:fld id="{3ABA01A1-4899-9944-833D-6A66CDE659CB}" type="datetimeFigureOut">
               <a:rPr kumimoji="1" lang="ja-JP" altLang="en-US" smtClean="0"/>
-              <a:t>16/09/17</a:t>
+              <a:t>17/05/08</a:t>
             </a:fld>
             <a:endParaRPr kumimoji="1" lang="ja-JP" altLang="en-US"/>
           </a:p>
@@ -3394,7 +3395,7 @@
           <a:p>
             <a:fld id="{3ABA01A1-4899-9944-833D-6A66CDE659CB}" type="datetimeFigureOut">
               <a:rPr kumimoji="1" lang="ja-JP" altLang="en-US" smtClean="0"/>
-              <a:t>16/09/17</a:t>
+              <a:t>17/05/08</a:t>
             </a:fld>
             <a:endParaRPr kumimoji="1" lang="ja-JP" altLang="en-US"/>
           </a:p>
@@ -3830,7 +3831,11 @@
             </a:r>
             <a:r>
               <a:rPr lang="en-US" altLang="ja-JP" sz="2800" dirty="0" smtClean="0"/>
-              <a:t>2016/09/16</a:t>
+              <a:t>2017/05/08</a:t>
+            </a:r>
+            <a:r>
+              <a:rPr lang="en-US" altLang="ja-JP" sz="2800" dirty="0" smtClean="0"/>
+              <a:t/>
             </a:r>
             <a:br>
               <a:rPr lang="en-US" altLang="ja-JP" sz="2800" dirty="0" smtClean="0"/>
@@ -3841,7 +3846,11 @@
             </a:r>
             <a:r>
               <a:rPr lang="en-US" altLang="ja-JP" sz="2800" dirty="0" smtClean="0"/>
-              <a:t> 1.1.0</a:t>
+              <a:t> </a:t>
+            </a:r>
+            <a:r>
+              <a:rPr lang="en-US" altLang="ja-JP" sz="2800" dirty="0" smtClean="0"/>
+              <a:t>1.2.0</a:t>
             </a:r>
             <a:endParaRPr kumimoji="1" lang="ja-JP" altLang="en-US" dirty="0"/>
           </a:p>
@@ -3925,7 +3934,7 @@
       </p:sp>
       <p:grpSp>
         <p:nvGrpSpPr>
-          <p:cNvPr id="8" name="図形グループ 7"/>
+          <p:cNvPr id="3" name="図形グループ 2"/>
           <p:cNvGrpSpPr/>
           <p:nvPr/>
         </p:nvGrpSpPr>
@@ -3937,22 +3946,987 @@
             <a:chExt cx="8085607" cy="5429564"/>
           </a:xfrm>
         </p:grpSpPr>
+        <p:grpSp>
+          <p:nvGrpSpPr>
+            <p:cNvPr id="8" name="図形グループ 7"/>
+            <p:cNvGrpSpPr/>
+            <p:nvPr/>
+          </p:nvGrpSpPr>
+          <p:grpSpPr>
+            <a:xfrm>
+              <a:off x="499501" y="1020233"/>
+              <a:ext cx="8085607" cy="5429564"/>
+              <a:chOff x="499501" y="1020233"/>
+              <a:chExt cx="8085607" cy="5429564"/>
+            </a:xfrm>
+          </p:grpSpPr>
+          <p:sp>
+            <p:nvSpPr>
+              <p:cNvPr id="5" name="正方形/長方形 4"/>
+              <p:cNvSpPr/>
+              <p:nvPr/>
+            </p:nvSpPr>
+            <p:spPr>
+              <a:xfrm>
+                <a:off x="502672" y="1378251"/>
+                <a:ext cx="4034605" cy="4709810"/>
+              </a:xfrm>
+              <a:prstGeom prst="rect">
+                <a:avLst/>
+              </a:prstGeom>
+              <a:noFill/>
+              <a:ln w="25400">
+                <a:solidFill>
+                  <a:schemeClr val="tx1"/>
+                </a:solidFill>
+              </a:ln>
+              <a:effectLst/>
+            </p:spPr>
+            <p:style>
+              <a:lnRef idx="1">
+                <a:schemeClr val="accent1"/>
+              </a:lnRef>
+              <a:fillRef idx="3">
+                <a:schemeClr val="accent1"/>
+              </a:fillRef>
+              <a:effectRef idx="2">
+                <a:schemeClr val="accent1"/>
+              </a:effectRef>
+              <a:fontRef idx="minor">
+                <a:schemeClr val="lt1"/>
+              </a:fontRef>
+            </p:style>
+            <p:txBody>
+              <a:bodyPr rtlCol="0" anchor="ctr"/>
+              <a:lstStyle/>
+              <a:p>
+                <a:pPr algn="ctr"/>
+                <a:r>
+                  <a:rPr kumimoji="1" lang="ja-JP" altLang="en-US" sz="2800" dirty="0" smtClean="0">
+                    <a:solidFill>
+                      <a:schemeClr val="tx1"/>
+                    </a:solidFill>
+                    <a:latin typeface="メイリオ"/>
+                    <a:ea typeface="メイリオ"/>
+                    <a:cs typeface="メイリオ"/>
+                  </a:rPr>
+                  <a:t>収入用テーブル</a:t>
+                </a:r>
+                <a:endParaRPr kumimoji="1" lang="ja-JP" altLang="en-US" sz="2800" dirty="0">
+                  <a:solidFill>
+                    <a:schemeClr val="tx1"/>
+                  </a:solidFill>
+                  <a:latin typeface="メイリオ"/>
+                  <a:ea typeface="メイリオ"/>
+                  <a:cs typeface="メイリオ"/>
+                </a:endParaRPr>
+              </a:p>
+            </p:txBody>
+          </p:sp>
+          <p:sp>
+            <p:nvSpPr>
+              <p:cNvPr id="6" name="正方形/長方形 5"/>
+              <p:cNvSpPr/>
+              <p:nvPr/>
+            </p:nvSpPr>
+            <p:spPr>
+              <a:xfrm>
+                <a:off x="4537277" y="1378252"/>
+                <a:ext cx="4047831" cy="4709810"/>
+              </a:xfrm>
+              <a:prstGeom prst="rect">
+                <a:avLst/>
+              </a:prstGeom>
+              <a:noFill/>
+              <a:ln w="25400">
+                <a:solidFill>
+                  <a:schemeClr val="tx1"/>
+                </a:solidFill>
+              </a:ln>
+              <a:effectLst/>
+            </p:spPr>
+            <p:style>
+              <a:lnRef idx="1">
+                <a:schemeClr val="accent1"/>
+              </a:lnRef>
+              <a:fillRef idx="3">
+                <a:schemeClr val="accent1"/>
+              </a:fillRef>
+              <a:effectRef idx="2">
+                <a:schemeClr val="accent1"/>
+              </a:effectRef>
+              <a:fontRef idx="minor">
+                <a:schemeClr val="lt1"/>
+              </a:fontRef>
+            </p:style>
+            <p:txBody>
+              <a:bodyPr rtlCol="0" anchor="ctr"/>
+              <a:lstStyle/>
+              <a:p>
+                <a:pPr algn="ctr"/>
+                <a:r>
+                  <a:rPr kumimoji="1" lang="ja-JP" altLang="en-US" sz="2800" dirty="0" smtClean="0">
+                    <a:solidFill>
+                      <a:schemeClr val="tx1"/>
+                    </a:solidFill>
+                    <a:latin typeface="メイリオ"/>
+                    <a:ea typeface="メイリオ"/>
+                    <a:cs typeface="メイリオ"/>
+                  </a:rPr>
+                  <a:t>支出用</a:t>
+                </a:r>
+                <a:r>
+                  <a:rPr lang="ja-JP" altLang="en-US" sz="2800" dirty="0" smtClean="0">
+                    <a:solidFill>
+                      <a:schemeClr val="tx1"/>
+                    </a:solidFill>
+                    <a:latin typeface="メイリオ"/>
+                    <a:ea typeface="メイリオ"/>
+                    <a:cs typeface="メイリオ"/>
+                  </a:rPr>
+                  <a:t>テーブル</a:t>
+                </a:r>
+                <a:endParaRPr kumimoji="1" lang="ja-JP" altLang="en-US" sz="2800" dirty="0">
+                  <a:solidFill>
+                    <a:schemeClr val="tx1"/>
+                  </a:solidFill>
+                  <a:latin typeface="メイリオ"/>
+                  <a:ea typeface="メイリオ"/>
+                  <a:cs typeface="メイリオ"/>
+                </a:endParaRPr>
+              </a:p>
+            </p:txBody>
+          </p:sp>
+          <p:sp>
+            <p:nvSpPr>
+              <p:cNvPr id="11" name="テキスト ボックス 10"/>
+              <p:cNvSpPr txBox="1"/>
+              <p:nvPr/>
+            </p:nvSpPr>
+            <p:spPr>
+              <a:xfrm>
+                <a:off x="5774820" y="1069600"/>
+                <a:ext cx="441146" cy="246221"/>
+              </a:xfrm>
+              <a:prstGeom prst="rect">
+                <a:avLst/>
+              </a:prstGeom>
+              <a:noFill/>
+            </p:spPr>
+            <p:txBody>
+              <a:bodyPr wrap="none" rtlCol="0">
+                <a:spAutoFit/>
+              </a:bodyPr>
+              <a:lstStyle/>
+              <a:p>
+                <a:r>
+                  <a:rPr lang="ja-JP" altLang="en-US" sz="1000" dirty="0" smtClean="0">
+                    <a:latin typeface="メイリオ"/>
+                    <a:ea typeface="メイリオ"/>
+                    <a:cs typeface="メイリオ"/>
+                  </a:rPr>
+                  <a:t>金額</a:t>
+                </a:r>
+                <a:endParaRPr kumimoji="1" lang="ja-JP" altLang="en-US" sz="1000" dirty="0">
+                  <a:latin typeface="メイリオ"/>
+                  <a:ea typeface="メイリオ"/>
+                  <a:cs typeface="メイリオ"/>
+                </a:endParaRPr>
+              </a:p>
+            </p:txBody>
+          </p:sp>
+          <p:sp>
+            <p:nvSpPr>
+              <p:cNvPr id="12" name="テキスト ボックス 11"/>
+              <p:cNvSpPr txBox="1"/>
+              <p:nvPr/>
+            </p:nvSpPr>
+            <p:spPr>
+              <a:xfrm>
+                <a:off x="4553129" y="1079918"/>
+                <a:ext cx="697627" cy="246221"/>
+              </a:xfrm>
+              <a:prstGeom prst="rect">
+                <a:avLst/>
+              </a:prstGeom>
+              <a:noFill/>
+            </p:spPr>
+            <p:txBody>
+              <a:bodyPr wrap="none" rtlCol="0">
+                <a:spAutoFit/>
+              </a:bodyPr>
+              <a:lstStyle/>
+              <a:p>
+                <a:r>
+                  <a:rPr lang="ja-JP" altLang="en-US" sz="1000" dirty="0" smtClean="0">
+                    <a:latin typeface="メイリオ"/>
+                    <a:ea typeface="メイリオ"/>
+                    <a:cs typeface="メイリオ"/>
+                  </a:rPr>
+                  <a:t>カテゴリ</a:t>
+                </a:r>
+                <a:endParaRPr kumimoji="1" lang="ja-JP" altLang="en-US" sz="1000" dirty="0">
+                  <a:latin typeface="メイリオ"/>
+                  <a:ea typeface="メイリオ"/>
+                  <a:cs typeface="メイリオ"/>
+                </a:endParaRPr>
+              </a:p>
+            </p:txBody>
+          </p:sp>
+          <p:sp>
+            <p:nvSpPr>
+              <p:cNvPr id="14" name="正方形/長方形 13"/>
+              <p:cNvSpPr/>
+              <p:nvPr/>
+            </p:nvSpPr>
+            <p:spPr>
+              <a:xfrm>
+                <a:off x="502672" y="1020233"/>
+                <a:ext cx="8082436" cy="358019"/>
+              </a:xfrm>
+              <a:prstGeom prst="rect">
+                <a:avLst/>
+              </a:prstGeom>
+              <a:noFill/>
+              <a:ln w="25400">
+                <a:solidFill>
+                  <a:schemeClr val="tx1"/>
+                </a:solidFill>
+              </a:ln>
+              <a:effectLst/>
+            </p:spPr>
+            <p:style>
+              <a:lnRef idx="1">
+                <a:schemeClr val="accent1"/>
+              </a:lnRef>
+              <a:fillRef idx="3">
+                <a:schemeClr val="accent1"/>
+              </a:fillRef>
+              <a:effectRef idx="2">
+                <a:schemeClr val="accent1"/>
+              </a:effectRef>
+              <a:fontRef idx="minor">
+                <a:schemeClr val="lt1"/>
+              </a:fontRef>
+            </p:style>
+            <p:txBody>
+              <a:bodyPr rtlCol="0" anchor="ctr"/>
+              <a:lstStyle/>
+              <a:p>
+                <a:pPr algn="ctr"/>
+                <a:endParaRPr kumimoji="1" lang="ja-JP" altLang="en-US" sz="2800" dirty="0">
+                  <a:solidFill>
+                    <a:schemeClr val="tx1"/>
+                  </a:solidFill>
+                  <a:latin typeface="メイリオ"/>
+                  <a:ea typeface="メイリオ"/>
+                  <a:cs typeface="メイリオ"/>
+                </a:endParaRPr>
+              </a:p>
+            </p:txBody>
+          </p:sp>
+          <p:sp>
+            <p:nvSpPr>
+              <p:cNvPr id="15" name="角丸四角形 14"/>
+              <p:cNvSpPr/>
+              <p:nvPr/>
+            </p:nvSpPr>
+            <p:spPr>
+              <a:xfrm>
+                <a:off x="5216121" y="1095102"/>
+                <a:ext cx="403341" cy="210113"/>
+              </a:xfrm>
+              <a:prstGeom prst="roundRect">
+                <a:avLst/>
+              </a:prstGeom>
+              <a:noFill/>
+              <a:ln w="25400">
+                <a:solidFill>
+                  <a:schemeClr val="tx1"/>
+                </a:solidFill>
+              </a:ln>
+              <a:effectLst/>
+            </p:spPr>
+            <p:style>
+              <a:lnRef idx="1">
+                <a:schemeClr val="accent1"/>
+              </a:lnRef>
+              <a:fillRef idx="3">
+                <a:schemeClr val="accent1"/>
+              </a:fillRef>
+              <a:effectRef idx="2">
+                <a:schemeClr val="accent1"/>
+              </a:effectRef>
+              <a:fontRef idx="minor">
+                <a:schemeClr val="lt1"/>
+              </a:fontRef>
+            </p:style>
+            <p:txBody>
+              <a:bodyPr rtlCol="0" anchor="ctr"/>
+              <a:lstStyle/>
+              <a:p>
+                <a:pPr algn="ctr"/>
+                <a:endParaRPr kumimoji="1" lang="ja-JP" altLang="en-US" dirty="0">
+                  <a:solidFill>
+                    <a:srgbClr val="000000"/>
+                  </a:solidFill>
+                  <a:latin typeface="メイリオ"/>
+                  <a:ea typeface="メイリオ"/>
+                  <a:cs typeface="メイリオ"/>
+                </a:endParaRPr>
+              </a:p>
+            </p:txBody>
+          </p:sp>
+          <p:sp>
+            <p:nvSpPr>
+              <p:cNvPr id="16" name="角丸四角形 15"/>
+              <p:cNvSpPr/>
+              <p:nvPr/>
+            </p:nvSpPr>
+            <p:spPr>
+              <a:xfrm>
+                <a:off x="2957181" y="1099003"/>
+                <a:ext cx="669614" cy="206212"/>
+              </a:xfrm>
+              <a:prstGeom prst="roundRect">
+                <a:avLst/>
+              </a:prstGeom>
+              <a:noFill/>
+              <a:ln w="25400">
+                <a:solidFill>
+                  <a:schemeClr val="tx1"/>
+                </a:solidFill>
+              </a:ln>
+              <a:effectLst/>
+            </p:spPr>
+            <p:style>
+              <a:lnRef idx="1">
+                <a:schemeClr val="accent1"/>
+              </a:lnRef>
+              <a:fillRef idx="3">
+                <a:schemeClr val="accent1"/>
+              </a:fillRef>
+              <a:effectRef idx="2">
+                <a:schemeClr val="accent1"/>
+              </a:effectRef>
+              <a:fontRef idx="minor">
+                <a:schemeClr val="lt1"/>
+              </a:fontRef>
+            </p:style>
+            <p:txBody>
+              <a:bodyPr rtlCol="0" anchor="ctr"/>
+              <a:lstStyle/>
+              <a:p>
+                <a:pPr algn="ctr"/>
+                <a:endParaRPr kumimoji="1" lang="ja-JP" altLang="en-US" dirty="0">
+                  <a:solidFill>
+                    <a:srgbClr val="000000"/>
+                  </a:solidFill>
+                  <a:latin typeface="メイリオ"/>
+                  <a:ea typeface="メイリオ"/>
+                  <a:cs typeface="メイリオ"/>
+                </a:endParaRPr>
+              </a:p>
+            </p:txBody>
+          </p:sp>
+          <p:sp>
+            <p:nvSpPr>
+              <p:cNvPr id="17" name="テキスト ボックス 16"/>
+              <p:cNvSpPr txBox="1"/>
+              <p:nvPr/>
+            </p:nvSpPr>
+            <p:spPr>
+              <a:xfrm>
+                <a:off x="2516035" y="1076950"/>
+                <a:ext cx="441146" cy="246221"/>
+              </a:xfrm>
+              <a:prstGeom prst="rect">
+                <a:avLst/>
+              </a:prstGeom>
+              <a:noFill/>
+            </p:spPr>
+            <p:txBody>
+              <a:bodyPr wrap="none" rtlCol="0">
+                <a:spAutoFit/>
+              </a:bodyPr>
+              <a:lstStyle/>
+              <a:p>
+                <a:r>
+                  <a:rPr lang="ja-JP" altLang="en-US" sz="1000" dirty="0" smtClean="0">
+                    <a:latin typeface="メイリオ"/>
+                    <a:ea typeface="メイリオ"/>
+                    <a:cs typeface="メイリオ"/>
+                  </a:rPr>
+                  <a:t>内容</a:t>
+                </a:r>
+                <a:endParaRPr kumimoji="1" lang="ja-JP" altLang="en-US" sz="1000" dirty="0">
+                  <a:latin typeface="メイリオ"/>
+                  <a:ea typeface="メイリオ"/>
+                  <a:cs typeface="メイリオ"/>
+                </a:endParaRPr>
+              </a:p>
+            </p:txBody>
+          </p:sp>
+          <p:sp>
+            <p:nvSpPr>
+              <p:cNvPr id="18" name="角丸四角形 17"/>
+              <p:cNvSpPr/>
+              <p:nvPr/>
+            </p:nvSpPr>
+            <p:spPr>
+              <a:xfrm>
+                <a:off x="917557" y="1101512"/>
+                <a:ext cx="642786" cy="209606"/>
+              </a:xfrm>
+              <a:prstGeom prst="roundRect">
+                <a:avLst/>
+              </a:prstGeom>
+              <a:noFill/>
+              <a:ln w="25400">
+                <a:solidFill>
+                  <a:schemeClr val="tx1"/>
+                </a:solidFill>
+              </a:ln>
+              <a:effectLst/>
+            </p:spPr>
+            <p:style>
+              <a:lnRef idx="1">
+                <a:schemeClr val="accent1"/>
+              </a:lnRef>
+              <a:fillRef idx="3">
+                <a:schemeClr val="accent1"/>
+              </a:fillRef>
+              <a:effectRef idx="2">
+                <a:schemeClr val="accent1"/>
+              </a:effectRef>
+              <a:fontRef idx="minor">
+                <a:schemeClr val="lt1"/>
+              </a:fontRef>
+            </p:style>
+            <p:txBody>
+              <a:bodyPr rtlCol="0" anchor="ctr"/>
+              <a:lstStyle/>
+              <a:p>
+                <a:pPr algn="ctr"/>
+                <a:endParaRPr kumimoji="1" lang="ja-JP" altLang="en-US" dirty="0">
+                  <a:solidFill>
+                    <a:srgbClr val="000000"/>
+                  </a:solidFill>
+                  <a:latin typeface="メイリオ"/>
+                  <a:ea typeface="メイリオ"/>
+                  <a:cs typeface="メイリオ"/>
+                </a:endParaRPr>
+              </a:p>
+            </p:txBody>
+          </p:sp>
+          <p:sp>
+            <p:nvSpPr>
+              <p:cNvPr id="19" name="テキスト ボックス 18"/>
+              <p:cNvSpPr txBox="1"/>
+              <p:nvPr/>
+            </p:nvSpPr>
+            <p:spPr>
+              <a:xfrm>
+                <a:off x="499501" y="1064825"/>
+                <a:ext cx="441146" cy="246221"/>
+              </a:xfrm>
+              <a:prstGeom prst="rect">
+                <a:avLst/>
+              </a:prstGeom>
+              <a:noFill/>
+            </p:spPr>
+            <p:txBody>
+              <a:bodyPr wrap="none" rtlCol="0">
+                <a:spAutoFit/>
+              </a:bodyPr>
+              <a:lstStyle/>
+              <a:p>
+                <a:r>
+                  <a:rPr lang="ja-JP" altLang="en-US" sz="1000" dirty="0" smtClean="0">
+                    <a:latin typeface="メイリオ"/>
+                    <a:ea typeface="メイリオ"/>
+                    <a:cs typeface="メイリオ"/>
+                  </a:rPr>
+                  <a:t>日付</a:t>
+                </a:r>
+                <a:endParaRPr kumimoji="1" lang="ja-JP" altLang="en-US" sz="1000" dirty="0">
+                  <a:latin typeface="メイリオ"/>
+                  <a:ea typeface="メイリオ"/>
+                  <a:cs typeface="メイリオ"/>
+                </a:endParaRPr>
+              </a:p>
+            </p:txBody>
+          </p:sp>
+          <p:sp>
+            <p:nvSpPr>
+              <p:cNvPr id="20" name="角丸四角形 19"/>
+              <p:cNvSpPr/>
+              <p:nvPr/>
+            </p:nvSpPr>
+            <p:spPr>
+              <a:xfrm>
+                <a:off x="7897091" y="1095609"/>
+                <a:ext cx="554024" cy="210112"/>
+              </a:xfrm>
+              <a:prstGeom prst="roundRect">
+                <a:avLst/>
+              </a:prstGeom>
+              <a:noFill/>
+              <a:ln w="25400">
+                <a:solidFill>
+                  <a:schemeClr val="tx1"/>
+                </a:solidFill>
+              </a:ln>
+              <a:effectLst/>
+            </p:spPr>
+            <p:style>
+              <a:lnRef idx="1">
+                <a:schemeClr val="accent1"/>
+              </a:lnRef>
+              <a:fillRef idx="3">
+                <a:schemeClr val="accent1"/>
+              </a:fillRef>
+              <a:effectRef idx="2">
+                <a:schemeClr val="accent1"/>
+              </a:effectRef>
+              <a:fontRef idx="minor">
+                <a:schemeClr val="lt1"/>
+              </a:fontRef>
+            </p:style>
+            <p:txBody>
+              <a:bodyPr rtlCol="0" anchor="ctr"/>
+              <a:lstStyle/>
+              <a:p>
+                <a:pPr algn="ctr"/>
+                <a:r>
+                  <a:rPr kumimoji="1" lang="ja-JP" altLang="en-US" sz="1200" dirty="0" smtClean="0">
+                    <a:solidFill>
+                      <a:srgbClr val="000000"/>
+                    </a:solidFill>
+                    <a:latin typeface="メイリオ"/>
+                    <a:ea typeface="メイリオ"/>
+                    <a:cs typeface="メイリオ"/>
+                  </a:rPr>
+                  <a:t>検索</a:t>
+                </a:r>
+                <a:endParaRPr kumimoji="1" lang="ja-JP" altLang="en-US" sz="1200" dirty="0">
+                  <a:solidFill>
+                    <a:srgbClr val="000000"/>
+                  </a:solidFill>
+                  <a:latin typeface="メイリオ"/>
+                  <a:ea typeface="メイリオ"/>
+                  <a:cs typeface="メイリオ"/>
+                </a:endParaRPr>
+              </a:p>
+            </p:txBody>
+          </p:sp>
+          <p:sp>
+            <p:nvSpPr>
+              <p:cNvPr id="22" name="正方形/長方形 21"/>
+              <p:cNvSpPr/>
+              <p:nvPr/>
+            </p:nvSpPr>
+            <p:spPr>
+              <a:xfrm>
+                <a:off x="502671" y="6091778"/>
+                <a:ext cx="8082437" cy="358019"/>
+              </a:xfrm>
+              <a:prstGeom prst="rect">
+                <a:avLst/>
+              </a:prstGeom>
+              <a:noFill/>
+              <a:ln w="25400">
+                <a:solidFill>
+                  <a:schemeClr val="tx1"/>
+                </a:solidFill>
+              </a:ln>
+              <a:effectLst/>
+            </p:spPr>
+            <p:style>
+              <a:lnRef idx="1">
+                <a:schemeClr val="accent1"/>
+              </a:lnRef>
+              <a:fillRef idx="3">
+                <a:schemeClr val="accent1"/>
+              </a:fillRef>
+              <a:effectRef idx="2">
+                <a:schemeClr val="accent1"/>
+              </a:effectRef>
+              <a:fontRef idx="minor">
+                <a:schemeClr val="lt1"/>
+              </a:fontRef>
+            </p:style>
+            <p:txBody>
+              <a:bodyPr rtlCol="0" anchor="ctr"/>
+              <a:lstStyle/>
+              <a:p>
+                <a:pPr algn="ctr"/>
+                <a:r>
+                  <a:rPr kumimoji="1" lang="ja-JP" altLang="en-US" sz="1400" dirty="0" smtClean="0">
+                    <a:solidFill>
+                      <a:srgbClr val="000000"/>
+                    </a:solidFill>
+                    <a:latin typeface="メイリオ"/>
+                    <a:ea typeface="メイリオ"/>
+                    <a:cs typeface="メイリオ"/>
+                  </a:rPr>
+                  <a:t>メッセージ表示</a:t>
+                </a:r>
+                <a:endParaRPr kumimoji="1" lang="ja-JP" altLang="en-US" sz="1400" dirty="0">
+                  <a:solidFill>
+                    <a:srgbClr val="000000"/>
+                  </a:solidFill>
+                  <a:latin typeface="メイリオ"/>
+                  <a:ea typeface="メイリオ"/>
+                  <a:cs typeface="メイリオ"/>
+                </a:endParaRPr>
+              </a:p>
+            </p:txBody>
+          </p:sp>
+          <p:sp>
+            <p:nvSpPr>
+              <p:cNvPr id="4" name="テキスト ボックス 3"/>
+              <p:cNvSpPr txBox="1"/>
+              <p:nvPr/>
+            </p:nvSpPr>
+            <p:spPr>
+              <a:xfrm>
+                <a:off x="6831667" y="1083557"/>
+                <a:ext cx="312906" cy="246221"/>
+              </a:xfrm>
+              <a:prstGeom prst="rect">
+                <a:avLst/>
+              </a:prstGeom>
+              <a:noFill/>
+            </p:spPr>
+            <p:txBody>
+              <a:bodyPr wrap="none" rtlCol="0">
+                <a:spAutoFit/>
+              </a:bodyPr>
+              <a:lstStyle/>
+              <a:p>
+                <a:r>
+                  <a:rPr kumimoji="1" lang="en-US" altLang="ja-JP" sz="1000" dirty="0" smtClean="0"/>
+                  <a:t>〜</a:t>
+                </a:r>
+                <a:endParaRPr kumimoji="1" lang="ja-JP" altLang="en-US" sz="1000" dirty="0"/>
+              </a:p>
+            </p:txBody>
+          </p:sp>
+          <p:sp>
+            <p:nvSpPr>
+              <p:cNvPr id="24" name="テキスト ボックス 23"/>
+              <p:cNvSpPr txBox="1"/>
+              <p:nvPr/>
+            </p:nvSpPr>
+            <p:spPr>
+              <a:xfrm>
+                <a:off x="1560343" y="1076371"/>
+                <a:ext cx="312906" cy="246221"/>
+              </a:xfrm>
+              <a:prstGeom prst="rect">
+                <a:avLst/>
+              </a:prstGeom>
+              <a:noFill/>
+            </p:spPr>
+            <p:txBody>
+              <a:bodyPr wrap="none" rtlCol="0">
+                <a:spAutoFit/>
+              </a:bodyPr>
+              <a:lstStyle/>
+              <a:p>
+                <a:r>
+                  <a:rPr kumimoji="1" lang="en-US" altLang="ja-JP" sz="1000" dirty="0" smtClean="0"/>
+                  <a:t>〜</a:t>
+                </a:r>
+                <a:endParaRPr kumimoji="1" lang="ja-JP" altLang="en-US" sz="1000" dirty="0"/>
+              </a:p>
+            </p:txBody>
+          </p:sp>
+          <p:sp>
+            <p:nvSpPr>
+              <p:cNvPr id="25" name="角丸四角形 24"/>
+              <p:cNvSpPr/>
+              <p:nvPr/>
+            </p:nvSpPr>
+            <p:spPr>
+              <a:xfrm>
+                <a:off x="1873249" y="1097215"/>
+                <a:ext cx="642786" cy="209606"/>
+              </a:xfrm>
+              <a:prstGeom prst="roundRect">
+                <a:avLst/>
+              </a:prstGeom>
+              <a:noFill/>
+              <a:ln w="25400">
+                <a:solidFill>
+                  <a:schemeClr val="tx1"/>
+                </a:solidFill>
+              </a:ln>
+              <a:effectLst/>
+            </p:spPr>
+            <p:style>
+              <a:lnRef idx="1">
+                <a:schemeClr val="accent1"/>
+              </a:lnRef>
+              <a:fillRef idx="3">
+                <a:schemeClr val="accent1"/>
+              </a:fillRef>
+              <a:effectRef idx="2">
+                <a:schemeClr val="accent1"/>
+              </a:effectRef>
+              <a:fontRef idx="minor">
+                <a:schemeClr val="lt1"/>
+              </a:fontRef>
+            </p:style>
+            <p:txBody>
+              <a:bodyPr rtlCol="0" anchor="ctr"/>
+              <a:lstStyle/>
+              <a:p>
+                <a:pPr algn="ctr"/>
+                <a:endParaRPr kumimoji="1" lang="ja-JP" altLang="en-US" dirty="0">
+                  <a:solidFill>
+                    <a:srgbClr val="000000"/>
+                  </a:solidFill>
+                  <a:latin typeface="メイリオ"/>
+                  <a:ea typeface="メイリオ"/>
+                  <a:cs typeface="メイリオ"/>
+                </a:endParaRPr>
+              </a:p>
+            </p:txBody>
+          </p:sp>
+          <p:sp>
+            <p:nvSpPr>
+              <p:cNvPr id="26" name="角丸四角形 25"/>
+              <p:cNvSpPr/>
+              <p:nvPr/>
+            </p:nvSpPr>
+            <p:spPr>
+              <a:xfrm>
+                <a:off x="3661177" y="1101512"/>
+                <a:ext cx="910482" cy="203703"/>
+              </a:xfrm>
+              <a:prstGeom prst="roundRect">
+                <a:avLst/>
+              </a:prstGeom>
+              <a:noFill/>
+              <a:ln w="25400">
+                <a:solidFill>
+                  <a:schemeClr val="tx1"/>
+                </a:solidFill>
+              </a:ln>
+              <a:effectLst/>
+            </p:spPr>
+            <p:style>
+              <a:lnRef idx="1">
+                <a:schemeClr val="accent1"/>
+              </a:lnRef>
+              <a:fillRef idx="3">
+                <a:schemeClr val="accent1"/>
+              </a:fillRef>
+              <a:effectRef idx="2">
+                <a:schemeClr val="accent1"/>
+              </a:effectRef>
+              <a:fontRef idx="minor">
+                <a:schemeClr val="lt1"/>
+              </a:fontRef>
+            </p:style>
+            <p:txBody>
+              <a:bodyPr rtlCol="0" anchor="ctr"/>
+              <a:lstStyle/>
+              <a:p>
+                <a:r>
+                  <a:rPr lang="ja-JP" altLang="en-US" sz="800" dirty="0" smtClean="0">
+                    <a:solidFill>
+                      <a:srgbClr val="000000"/>
+                    </a:solidFill>
+                    <a:latin typeface="メイリオ"/>
+                    <a:ea typeface="メイリオ"/>
+                    <a:cs typeface="メイリオ"/>
+                  </a:rPr>
+                  <a:t>と一致する</a:t>
+                </a:r>
+                <a:endParaRPr kumimoji="1" lang="ja-JP" altLang="en-US" sz="800" dirty="0">
+                  <a:solidFill>
+                    <a:srgbClr val="000000"/>
+                  </a:solidFill>
+                  <a:latin typeface="メイリオ"/>
+                  <a:ea typeface="メイリオ"/>
+                  <a:cs typeface="メイリオ"/>
+                </a:endParaRPr>
+              </a:p>
+            </p:txBody>
+          </p:sp>
+          <p:sp>
+            <p:nvSpPr>
+              <p:cNvPr id="7" name="二等辺三角形 6"/>
+              <p:cNvSpPr/>
+              <p:nvPr/>
+            </p:nvSpPr>
+            <p:spPr>
+              <a:xfrm flipH="1" flipV="1">
+                <a:off x="4381832" y="1148614"/>
+                <a:ext cx="108000" cy="108000"/>
+              </a:xfrm>
+              <a:prstGeom prst="triangle">
+                <a:avLst/>
+              </a:prstGeom>
+              <a:solidFill>
+                <a:schemeClr val="tx1"/>
+              </a:solidFill>
+              <a:ln>
+                <a:solidFill>
+                  <a:schemeClr val="tx1"/>
+                </a:solidFill>
+              </a:ln>
+              <a:effectLst/>
+            </p:spPr>
+            <p:style>
+              <a:lnRef idx="1">
+                <a:schemeClr val="accent1"/>
+              </a:lnRef>
+              <a:fillRef idx="3">
+                <a:schemeClr val="accent1"/>
+              </a:fillRef>
+              <a:effectRef idx="2">
+                <a:schemeClr val="accent1"/>
+              </a:effectRef>
+              <a:fontRef idx="minor">
+                <a:schemeClr val="lt1"/>
+              </a:fontRef>
+            </p:style>
+            <p:txBody>
+              <a:bodyPr rtlCol="0" anchor="ctr"/>
+              <a:lstStyle/>
+              <a:p>
+                <a:pPr algn="ctr"/>
+                <a:endParaRPr kumimoji="1" lang="ja-JP" altLang="en-US"/>
+              </a:p>
+            </p:txBody>
+          </p:sp>
+          <p:sp>
+            <p:nvSpPr>
+              <p:cNvPr id="27" name="角丸四角形 26"/>
+              <p:cNvSpPr/>
+              <p:nvPr/>
+            </p:nvSpPr>
+            <p:spPr>
+              <a:xfrm>
+                <a:off x="6206129" y="1091915"/>
+                <a:ext cx="642786" cy="209606"/>
+              </a:xfrm>
+              <a:prstGeom prst="roundRect">
+                <a:avLst/>
+              </a:prstGeom>
+              <a:noFill/>
+              <a:ln w="25400">
+                <a:solidFill>
+                  <a:schemeClr val="tx1"/>
+                </a:solidFill>
+              </a:ln>
+              <a:effectLst/>
+            </p:spPr>
+            <p:style>
+              <a:lnRef idx="1">
+                <a:schemeClr val="accent1"/>
+              </a:lnRef>
+              <a:fillRef idx="3">
+                <a:schemeClr val="accent1"/>
+              </a:fillRef>
+              <a:effectRef idx="2">
+                <a:schemeClr val="accent1"/>
+              </a:effectRef>
+              <a:fontRef idx="minor">
+                <a:schemeClr val="lt1"/>
+              </a:fontRef>
+            </p:style>
+            <p:txBody>
+              <a:bodyPr rtlCol="0" anchor="ctr"/>
+              <a:lstStyle/>
+              <a:p>
+                <a:pPr algn="ctr"/>
+                <a:endParaRPr kumimoji="1" lang="ja-JP" altLang="en-US" dirty="0">
+                  <a:solidFill>
+                    <a:srgbClr val="000000"/>
+                  </a:solidFill>
+                  <a:latin typeface="メイリオ"/>
+                  <a:ea typeface="メイリオ"/>
+                  <a:cs typeface="メイリオ"/>
+                </a:endParaRPr>
+              </a:p>
+            </p:txBody>
+          </p:sp>
+          <p:sp>
+            <p:nvSpPr>
+              <p:cNvPr id="28" name="角丸四角形 27"/>
+              <p:cNvSpPr/>
+              <p:nvPr/>
+            </p:nvSpPr>
+            <p:spPr>
+              <a:xfrm>
+                <a:off x="7123189" y="1091915"/>
+                <a:ext cx="642786" cy="209606"/>
+              </a:xfrm>
+              <a:prstGeom prst="roundRect">
+                <a:avLst/>
+              </a:prstGeom>
+              <a:noFill/>
+              <a:ln w="25400">
+                <a:solidFill>
+                  <a:schemeClr val="tx1"/>
+                </a:solidFill>
+              </a:ln>
+              <a:effectLst/>
+            </p:spPr>
+            <p:style>
+              <a:lnRef idx="1">
+                <a:schemeClr val="accent1"/>
+              </a:lnRef>
+              <a:fillRef idx="3">
+                <a:schemeClr val="accent1"/>
+              </a:fillRef>
+              <a:effectRef idx="2">
+                <a:schemeClr val="accent1"/>
+              </a:effectRef>
+              <a:fontRef idx="minor">
+                <a:schemeClr val="lt1"/>
+              </a:fontRef>
+            </p:style>
+            <p:txBody>
+              <a:bodyPr rtlCol="0" anchor="ctr"/>
+              <a:lstStyle/>
+              <a:p>
+                <a:pPr algn="ctr"/>
+                <a:endParaRPr kumimoji="1" lang="ja-JP" altLang="en-US" dirty="0">
+                  <a:solidFill>
+                    <a:srgbClr val="000000"/>
+                  </a:solidFill>
+                  <a:latin typeface="メイリオ"/>
+                  <a:ea typeface="メイリオ"/>
+                  <a:cs typeface="メイリオ"/>
+                </a:endParaRPr>
+              </a:p>
+            </p:txBody>
+          </p:sp>
+        </p:grpSp>
         <p:sp>
           <p:nvSpPr>
-            <p:cNvPr id="5" name="正方形/長方形 4"/>
+            <p:cNvPr id="23" name="二等辺三角形 22"/>
             <p:cNvSpPr/>
             <p:nvPr/>
           </p:nvSpPr>
           <p:spPr>
-            <a:xfrm>
-              <a:off x="502672" y="1378251"/>
-              <a:ext cx="4034605" cy="4709810"/>
+            <a:xfrm flipH="1" flipV="1">
+              <a:off x="5677187" y="1150929"/>
+              <a:ext cx="108000" cy="108000"/>
             </a:xfrm>
-            <a:prstGeom prst="rect">
+            <a:prstGeom prst="triangle">
               <a:avLst/>
             </a:prstGeom>
-            <a:noFill/>
-            <a:ln w="25400">
+            <a:solidFill>
+              <a:schemeClr val="tx1"/>
+            </a:solidFill>
+            <a:ln>
               <a:solidFill>
                 <a:schemeClr val="tx1"/>
               </a:solidFill>
@@ -3978,188 +4952,111 @@
             <a:lstStyle/>
             <a:p>
               <a:pPr algn="ctr"/>
-              <a:r>
-                <a:rPr kumimoji="1" lang="ja-JP" altLang="en-US" sz="2800" dirty="0" smtClean="0">
-                  <a:solidFill>
-                    <a:schemeClr val="tx1"/>
-                  </a:solidFill>
-                  <a:latin typeface="メイリオ"/>
-                  <a:ea typeface="メイリオ"/>
-                  <a:cs typeface="メイリオ"/>
-                </a:rPr>
-                <a:t>収入用テーブル</a:t>
-              </a:r>
-              <a:endParaRPr kumimoji="1" lang="ja-JP" altLang="en-US" sz="2800" dirty="0">
-                <a:solidFill>
-                  <a:schemeClr val="tx1"/>
-                </a:solidFill>
+              <a:endParaRPr kumimoji="1" lang="ja-JP" altLang="en-US"/>
+            </a:p>
+          </p:txBody>
+        </p:sp>
+      </p:grpSp>
+    </p:spTree>
+    <p:extLst>
+      <p:ext uri="{BB962C8B-B14F-4D97-AF65-F5344CB8AC3E}">
+        <p14:creationId xmlns:p14="http://schemas.microsoft.com/office/powerpoint/2010/main" val="3661719748"/>
+      </p:ext>
+    </p:extLst>
+  </p:cSld>
+  <p:clrMapOvr>
+    <a:masterClrMapping/>
+  </p:clrMapOvr>
+</p:sld>
+</file>
+
+<file path=ppt/slides/slide3.xml><?xml version="1.0" encoding="utf-8"?>
+<p:sld xmlns:a="http://schemas.openxmlformats.org/drawingml/2006/main" xmlns:r="http://schemas.openxmlformats.org/officeDocument/2006/relationships" xmlns:p="http://schemas.openxmlformats.org/presentationml/2006/main">
+  <p:cSld>
+    <p:spTree>
+      <p:nvGrpSpPr>
+        <p:cNvPr id="1" name=""/>
+        <p:cNvGrpSpPr/>
+        <p:nvPr/>
+      </p:nvGrpSpPr>
+      <p:grpSpPr>
+        <a:xfrm>
+          <a:off x="0" y="0"/>
+          <a:ext cx="0" cy="0"/>
+          <a:chOff x="0" y="0"/>
+          <a:chExt cx="0" cy="0"/>
+        </a:xfrm>
+      </p:grpSpPr>
+      <p:sp>
+        <p:nvSpPr>
+          <p:cNvPr id="2" name="テキスト ボックス 1"/>
+          <p:cNvSpPr txBox="1"/>
+          <p:nvPr/>
+        </p:nvSpPr>
+        <p:spPr>
+          <a:xfrm>
+            <a:off x="200532" y="187161"/>
+            <a:ext cx="3057247" cy="523220"/>
+          </a:xfrm>
+          <a:prstGeom prst="rect">
+            <a:avLst/>
+          </a:prstGeom>
+          <a:noFill/>
+        </p:spPr>
+        <p:txBody>
+          <a:bodyPr wrap="none" rtlCol="0">
+            <a:spAutoFit/>
+          </a:bodyPr>
+          <a:lstStyle/>
+          <a:p>
+            <a:r>
+              <a:rPr lang="ja-JP" altLang="en-US" sz="2800" dirty="0" smtClean="0">
                 <a:latin typeface="メイリオ"/>
                 <a:ea typeface="メイリオ"/>
                 <a:cs typeface="メイリオ"/>
-              </a:endParaRPr>
-            </a:p>
-          </p:txBody>
-        </p:sp>
+              </a:rPr>
+              <a:t>カテゴリ選択</a:t>
+            </a:r>
+            <a:r>
+              <a:rPr kumimoji="1" lang="ja-JP" altLang="en-US" sz="2800" dirty="0" smtClean="0">
+                <a:latin typeface="メイリオ"/>
+                <a:ea typeface="メイリオ"/>
+                <a:cs typeface="メイリオ"/>
+              </a:rPr>
+              <a:t>画面</a:t>
+            </a:r>
+            <a:endParaRPr kumimoji="1" lang="ja-JP" altLang="en-US" sz="2800" dirty="0">
+              <a:latin typeface="メイリオ"/>
+              <a:ea typeface="メイリオ"/>
+              <a:cs typeface="メイリオ"/>
+            </a:endParaRPr>
+          </a:p>
+        </p:txBody>
+      </p:sp>
+      <p:grpSp>
+        <p:nvGrpSpPr>
+          <p:cNvPr id="56" name="図形グループ 55"/>
+          <p:cNvGrpSpPr/>
+          <p:nvPr/>
+        </p:nvGrpSpPr>
+        <p:grpSpPr>
+          <a:xfrm>
+            <a:off x="2565312" y="1265685"/>
+            <a:ext cx="3161233" cy="4709810"/>
+            <a:chOff x="2565312" y="1265685"/>
+            <a:chExt cx="3161233" cy="4709810"/>
+          </a:xfrm>
+        </p:grpSpPr>
         <p:sp>
           <p:nvSpPr>
-            <p:cNvPr id="6" name="正方形/長方形 5"/>
+            <p:cNvPr id="29" name="正方形/長方形 28"/>
             <p:cNvSpPr/>
             <p:nvPr/>
           </p:nvSpPr>
           <p:spPr>
             <a:xfrm>
-              <a:off x="4537277" y="1378252"/>
-              <a:ext cx="4047831" cy="4709810"/>
-            </a:xfrm>
-            <a:prstGeom prst="rect">
-              <a:avLst/>
-            </a:prstGeom>
-            <a:noFill/>
-            <a:ln w="25400">
-              <a:solidFill>
-                <a:schemeClr val="tx1"/>
-              </a:solidFill>
-            </a:ln>
-            <a:effectLst/>
-          </p:spPr>
-          <p:style>
-            <a:lnRef idx="1">
-              <a:schemeClr val="accent1"/>
-            </a:lnRef>
-            <a:fillRef idx="3">
-              <a:schemeClr val="accent1"/>
-            </a:fillRef>
-            <a:effectRef idx="2">
-              <a:schemeClr val="accent1"/>
-            </a:effectRef>
-            <a:fontRef idx="minor">
-              <a:schemeClr val="lt1"/>
-            </a:fontRef>
-          </p:style>
-          <p:txBody>
-            <a:bodyPr rtlCol="0" anchor="ctr"/>
-            <a:lstStyle/>
-            <a:p>
-              <a:pPr algn="ctr"/>
-              <a:r>
-                <a:rPr kumimoji="1" lang="ja-JP" altLang="en-US" sz="2800" dirty="0" smtClean="0">
-                  <a:solidFill>
-                    <a:schemeClr val="tx1"/>
-                  </a:solidFill>
-                  <a:latin typeface="メイリオ"/>
-                  <a:ea typeface="メイリオ"/>
-                  <a:cs typeface="メイリオ"/>
-                </a:rPr>
-                <a:t>支出用</a:t>
-              </a:r>
-              <a:r>
-                <a:rPr lang="ja-JP" altLang="en-US" sz="2800" dirty="0" smtClean="0">
-                  <a:solidFill>
-                    <a:schemeClr val="tx1"/>
-                  </a:solidFill>
-                  <a:latin typeface="メイリオ"/>
-                  <a:ea typeface="メイリオ"/>
-                  <a:cs typeface="メイリオ"/>
-                </a:rPr>
-                <a:t>テーブル</a:t>
-              </a:r>
-              <a:endParaRPr kumimoji="1" lang="ja-JP" altLang="en-US" sz="2800" dirty="0">
-                <a:solidFill>
-                  <a:schemeClr val="tx1"/>
-                </a:solidFill>
-                <a:latin typeface="メイリオ"/>
-                <a:ea typeface="メイリオ"/>
-                <a:cs typeface="メイリオ"/>
-              </a:endParaRPr>
-            </a:p>
-          </p:txBody>
-        </p:sp>
-        <p:sp>
-          <p:nvSpPr>
-            <p:cNvPr id="11" name="テキスト ボックス 10"/>
-            <p:cNvSpPr txBox="1"/>
-            <p:nvPr/>
-          </p:nvSpPr>
-          <p:spPr>
-            <a:xfrm>
-              <a:off x="5774820" y="1069600"/>
-              <a:ext cx="441146" cy="246221"/>
-            </a:xfrm>
-            <a:prstGeom prst="rect">
-              <a:avLst/>
-            </a:prstGeom>
-            <a:noFill/>
-          </p:spPr>
-          <p:txBody>
-            <a:bodyPr wrap="none" rtlCol="0">
-              <a:spAutoFit/>
-            </a:bodyPr>
-            <a:lstStyle/>
-            <a:p>
-              <a:r>
-                <a:rPr lang="ja-JP" altLang="en-US" sz="1000" dirty="0" smtClean="0">
-                  <a:latin typeface="メイリオ"/>
-                  <a:ea typeface="メイリオ"/>
-                  <a:cs typeface="メイリオ"/>
-                </a:rPr>
-                <a:t>金額</a:t>
-              </a:r>
-              <a:endParaRPr kumimoji="1" lang="ja-JP" altLang="en-US" sz="1000" dirty="0">
-                <a:latin typeface="メイリオ"/>
-                <a:ea typeface="メイリオ"/>
-                <a:cs typeface="メイリオ"/>
-              </a:endParaRPr>
-            </a:p>
-          </p:txBody>
-        </p:sp>
-        <p:sp>
-          <p:nvSpPr>
-            <p:cNvPr id="12" name="テキスト ボックス 11"/>
-            <p:cNvSpPr txBox="1"/>
-            <p:nvPr/>
-          </p:nvSpPr>
-          <p:spPr>
-            <a:xfrm>
-              <a:off x="4553129" y="1079918"/>
-              <a:ext cx="697627" cy="246221"/>
-            </a:xfrm>
-            <a:prstGeom prst="rect">
-              <a:avLst/>
-            </a:prstGeom>
-            <a:noFill/>
-          </p:spPr>
-          <p:txBody>
-            <a:bodyPr wrap="none" rtlCol="0">
-              <a:spAutoFit/>
-            </a:bodyPr>
-            <a:lstStyle/>
-            <a:p>
-              <a:r>
-                <a:rPr lang="ja-JP" altLang="en-US" sz="1000" dirty="0" smtClean="0">
-                  <a:latin typeface="メイリオ"/>
-                  <a:ea typeface="メイリオ"/>
-                  <a:cs typeface="メイリオ"/>
-                </a:rPr>
-                <a:t>カテゴリ</a:t>
-              </a:r>
-              <a:endParaRPr kumimoji="1" lang="ja-JP" altLang="en-US" sz="1000" dirty="0">
-                <a:latin typeface="メイリオ"/>
-                <a:ea typeface="メイリオ"/>
-                <a:cs typeface="メイリオ"/>
-              </a:endParaRPr>
-            </a:p>
-          </p:txBody>
-        </p:sp>
-        <p:sp>
-          <p:nvSpPr>
-            <p:cNvPr id="14" name="正方形/長方形 13"/>
-            <p:cNvSpPr/>
-            <p:nvPr/>
-          </p:nvSpPr>
-          <p:spPr>
-            <a:xfrm>
-              <a:off x="502672" y="1020233"/>
-              <a:ext cx="8082436" cy="358019"/>
+              <a:off x="2565312" y="1265685"/>
+              <a:ext cx="3161233" cy="4709810"/>
             </a:xfrm>
             <a:prstGeom prst="rect">
               <a:avLst/>
@@ -4202,16 +5099,199 @@
             </a:p>
           </p:txBody>
         </p:sp>
+        <p:cxnSp>
+          <p:nvCxnSpPr>
+            <p:cNvPr id="10" name="直線コネクタ 9"/>
+            <p:cNvCxnSpPr>
+              <a:stCxn id="29" idx="1"/>
+              <a:endCxn id="29" idx="3"/>
+            </p:cNvCxnSpPr>
+            <p:nvPr/>
+          </p:nvCxnSpPr>
+          <p:spPr>
+            <a:xfrm>
+              <a:off x="2565312" y="3620590"/>
+              <a:ext cx="3161233" cy="0"/>
+            </a:xfrm>
+            <a:prstGeom prst="line">
+              <a:avLst/>
+            </a:prstGeom>
+            <a:ln w="19050">
+              <a:solidFill>
+                <a:schemeClr val="tx1"/>
+              </a:solidFill>
+            </a:ln>
+            <a:effectLst/>
+          </p:spPr>
+          <p:style>
+            <a:lnRef idx="2">
+              <a:schemeClr val="accent1"/>
+            </a:lnRef>
+            <a:fillRef idx="0">
+              <a:schemeClr val="accent1"/>
+            </a:fillRef>
+            <a:effectRef idx="1">
+              <a:schemeClr val="accent1"/>
+            </a:effectRef>
+            <a:fontRef idx="minor">
+              <a:schemeClr val="tx1"/>
+            </a:fontRef>
+          </p:style>
+        </p:cxnSp>
+        <p:cxnSp>
+          <p:nvCxnSpPr>
+            <p:cNvPr id="31" name="直線コネクタ 30"/>
+            <p:cNvCxnSpPr/>
+            <p:nvPr/>
+          </p:nvCxnSpPr>
+          <p:spPr>
+            <a:xfrm>
+              <a:off x="2565312" y="3172625"/>
+              <a:ext cx="3161233" cy="0"/>
+            </a:xfrm>
+            <a:prstGeom prst="line">
+              <a:avLst/>
+            </a:prstGeom>
+            <a:ln w="19050">
+              <a:solidFill>
+                <a:schemeClr val="tx1"/>
+              </a:solidFill>
+            </a:ln>
+            <a:effectLst/>
+          </p:spPr>
+          <p:style>
+            <a:lnRef idx="2">
+              <a:schemeClr val="accent1"/>
+            </a:lnRef>
+            <a:fillRef idx="0">
+              <a:schemeClr val="accent1"/>
+            </a:fillRef>
+            <a:effectRef idx="1">
+              <a:schemeClr val="accent1"/>
+            </a:effectRef>
+            <a:fontRef idx="minor">
+              <a:schemeClr val="tx1"/>
+            </a:fontRef>
+          </p:style>
+        </p:cxnSp>
+        <p:cxnSp>
+          <p:nvCxnSpPr>
+            <p:cNvPr id="32" name="直線コネクタ 31"/>
+            <p:cNvCxnSpPr/>
+            <p:nvPr/>
+          </p:nvCxnSpPr>
+          <p:spPr>
+            <a:xfrm>
+              <a:off x="2565312" y="2724659"/>
+              <a:ext cx="3161233" cy="0"/>
+            </a:xfrm>
+            <a:prstGeom prst="line">
+              <a:avLst/>
+            </a:prstGeom>
+            <a:ln w="19050">
+              <a:solidFill>
+                <a:schemeClr val="tx1"/>
+              </a:solidFill>
+            </a:ln>
+            <a:effectLst/>
+          </p:spPr>
+          <p:style>
+            <a:lnRef idx="2">
+              <a:schemeClr val="accent1"/>
+            </a:lnRef>
+            <a:fillRef idx="0">
+              <a:schemeClr val="accent1"/>
+            </a:fillRef>
+            <a:effectRef idx="1">
+              <a:schemeClr val="accent1"/>
+            </a:effectRef>
+            <a:fontRef idx="minor">
+              <a:schemeClr val="tx1"/>
+            </a:fontRef>
+          </p:style>
+        </p:cxnSp>
+        <p:cxnSp>
+          <p:nvCxnSpPr>
+            <p:cNvPr id="33" name="直線コネクタ 32"/>
+            <p:cNvCxnSpPr/>
+            <p:nvPr/>
+          </p:nvCxnSpPr>
+          <p:spPr>
+            <a:xfrm>
+              <a:off x="2565312" y="2265149"/>
+              <a:ext cx="3161233" cy="0"/>
+            </a:xfrm>
+            <a:prstGeom prst="line">
+              <a:avLst/>
+            </a:prstGeom>
+            <a:ln w="19050">
+              <a:solidFill>
+                <a:schemeClr val="tx1"/>
+              </a:solidFill>
+            </a:ln>
+            <a:effectLst/>
+          </p:spPr>
+          <p:style>
+            <a:lnRef idx="2">
+              <a:schemeClr val="accent1"/>
+            </a:lnRef>
+            <a:fillRef idx="0">
+              <a:schemeClr val="accent1"/>
+            </a:fillRef>
+            <a:effectRef idx="1">
+              <a:schemeClr val="accent1"/>
+            </a:effectRef>
+            <a:fontRef idx="minor">
+              <a:schemeClr val="tx1"/>
+            </a:fontRef>
+          </p:style>
+        </p:cxnSp>
+        <p:cxnSp>
+          <p:nvCxnSpPr>
+            <p:cNvPr id="34" name="直線コネクタ 33"/>
+            <p:cNvCxnSpPr/>
+            <p:nvPr/>
+          </p:nvCxnSpPr>
+          <p:spPr>
+            <a:xfrm>
+              <a:off x="2565312" y="1805640"/>
+              <a:ext cx="3161233" cy="0"/>
+            </a:xfrm>
+            <a:prstGeom prst="line">
+              <a:avLst/>
+            </a:prstGeom>
+            <a:ln w="19050">
+              <a:solidFill>
+                <a:schemeClr val="tx1"/>
+              </a:solidFill>
+            </a:ln>
+            <a:effectLst/>
+          </p:spPr>
+          <p:style>
+            <a:lnRef idx="2">
+              <a:schemeClr val="accent1"/>
+            </a:lnRef>
+            <a:fillRef idx="0">
+              <a:schemeClr val="accent1"/>
+            </a:fillRef>
+            <a:effectRef idx="1">
+              <a:schemeClr val="accent1"/>
+            </a:effectRef>
+            <a:fontRef idx="minor">
+              <a:schemeClr val="tx1"/>
+            </a:fontRef>
+          </p:style>
+        </p:cxnSp>
         <p:sp>
           <p:nvSpPr>
-            <p:cNvPr id="15" name="角丸四角形 14"/>
+            <p:cNvPr id="35" name="角丸四角形 34"/>
             <p:cNvSpPr/>
             <p:nvPr/>
           </p:nvSpPr>
           <p:spPr>
             <a:xfrm>
-              <a:off x="5216121" y="1095102"/>
-              <a:ext cx="558699" cy="210113"/>
+              <a:off x="5397186" y="1932785"/>
+              <a:ext cx="213897" cy="209606"/>
             </a:xfrm>
             <a:prstGeom prst="roundRect">
               <a:avLst/>
@@ -4256,14 +5336,14 @@
         </p:sp>
         <p:sp>
           <p:nvSpPr>
-            <p:cNvPr id="16" name="角丸四角形 15"/>
+            <p:cNvPr id="36" name="角丸四角形 35"/>
             <p:cNvSpPr/>
             <p:nvPr/>
           </p:nvSpPr>
           <p:spPr>
             <a:xfrm>
-              <a:off x="2957181" y="1099003"/>
-              <a:ext cx="669614" cy="206212"/>
+              <a:off x="5397186" y="2396912"/>
+              <a:ext cx="213897" cy="209606"/>
             </a:xfrm>
             <a:prstGeom prst="roundRect">
               <a:avLst/>
@@ -4308,52 +5388,14 @@
         </p:sp>
         <p:sp>
           <p:nvSpPr>
-            <p:cNvPr id="17" name="テキスト ボックス 16"/>
-            <p:cNvSpPr txBox="1"/>
-            <p:nvPr/>
-          </p:nvSpPr>
-          <p:spPr>
-            <a:xfrm>
-              <a:off x="2516035" y="1076950"/>
-              <a:ext cx="441146" cy="246221"/>
-            </a:xfrm>
-            <a:prstGeom prst="rect">
-              <a:avLst/>
-            </a:prstGeom>
-            <a:noFill/>
-          </p:spPr>
-          <p:txBody>
-            <a:bodyPr wrap="none" rtlCol="0">
-              <a:spAutoFit/>
-            </a:bodyPr>
-            <a:lstStyle/>
-            <a:p>
-              <a:r>
-                <a:rPr lang="ja-JP" altLang="en-US" sz="1000" dirty="0" smtClean="0">
-                  <a:latin typeface="メイリオ"/>
-                  <a:ea typeface="メイリオ"/>
-                  <a:cs typeface="メイリオ"/>
-                </a:rPr>
-                <a:t>内容</a:t>
-              </a:r>
-              <a:endParaRPr kumimoji="1" lang="ja-JP" altLang="en-US" sz="1000" dirty="0">
-                <a:latin typeface="メイリオ"/>
-                <a:ea typeface="メイリオ"/>
-                <a:cs typeface="メイリオ"/>
-              </a:endParaRPr>
-            </a:p>
-          </p:txBody>
-        </p:sp>
-        <p:sp>
-          <p:nvSpPr>
-            <p:cNvPr id="18" name="角丸四角形 17"/>
+            <p:cNvPr id="37" name="角丸四角形 36"/>
             <p:cNvSpPr/>
             <p:nvPr/>
           </p:nvSpPr>
           <p:spPr>
             <a:xfrm>
-              <a:off x="917557" y="1101512"/>
-              <a:ext cx="642786" cy="209606"/>
+              <a:off x="5397186" y="2837948"/>
+              <a:ext cx="213897" cy="209606"/>
             </a:xfrm>
             <a:prstGeom prst="roundRect">
               <a:avLst/>
@@ -4398,52 +5440,14 @@
         </p:sp>
         <p:sp>
           <p:nvSpPr>
-            <p:cNvPr id="19" name="テキスト ボックス 18"/>
-            <p:cNvSpPr txBox="1"/>
-            <p:nvPr/>
-          </p:nvSpPr>
-          <p:spPr>
-            <a:xfrm>
-              <a:off x="499501" y="1064825"/>
-              <a:ext cx="441146" cy="246221"/>
-            </a:xfrm>
-            <a:prstGeom prst="rect">
-              <a:avLst/>
-            </a:prstGeom>
-            <a:noFill/>
-          </p:spPr>
-          <p:txBody>
-            <a:bodyPr wrap="none" rtlCol="0">
-              <a:spAutoFit/>
-            </a:bodyPr>
-            <a:lstStyle/>
-            <a:p>
-              <a:r>
-                <a:rPr lang="ja-JP" altLang="en-US" sz="1000" dirty="0" smtClean="0">
-                  <a:latin typeface="メイリオ"/>
-                  <a:ea typeface="メイリオ"/>
-                  <a:cs typeface="メイリオ"/>
-                </a:rPr>
-                <a:t>日付</a:t>
-              </a:r>
-              <a:endParaRPr kumimoji="1" lang="ja-JP" altLang="en-US" sz="1000" dirty="0">
-                <a:latin typeface="メイリオ"/>
-                <a:ea typeface="メイリオ"/>
-                <a:cs typeface="メイリオ"/>
-              </a:endParaRPr>
-            </a:p>
-          </p:txBody>
-        </p:sp>
-        <p:sp>
-          <p:nvSpPr>
-            <p:cNvPr id="20" name="角丸四角形 19"/>
+            <p:cNvPr id="38" name="角丸四角形 37"/>
             <p:cNvSpPr/>
             <p:nvPr/>
           </p:nvSpPr>
           <p:spPr>
             <a:xfrm>
-              <a:off x="7897091" y="1095609"/>
-              <a:ext cx="554024" cy="210112"/>
+              <a:off x="5397186" y="3295965"/>
+              <a:ext cx="213897" cy="209606"/>
             </a:xfrm>
             <a:prstGeom prst="roundRect">
               <a:avLst/>
@@ -4475,18 +5479,7 @@
             <a:lstStyle/>
             <a:p>
               <a:pPr algn="ctr"/>
-              <a:r>
-                <a:rPr kumimoji="1" lang="ja-JP" altLang="en-US" sz="1200" dirty="0" smtClean="0">
-                  <a:solidFill>
-                    <a:srgbClr val="000000"/>
-                  </a:solidFill>
-                  <a:latin typeface="メイリオ"/>
-                  <a:ea typeface="メイリオ"/>
-                  <a:cs typeface="メイリオ"/>
-                </a:rPr>
-                <a:t>検索</a:t>
-              </a:r>
-              <a:endParaRPr kumimoji="1" lang="ja-JP" altLang="en-US" sz="1200" dirty="0">
+              <a:endParaRPr kumimoji="1" lang="ja-JP" altLang="en-US" dirty="0">
                 <a:solidFill>
                   <a:srgbClr val="000000"/>
                 </a:solidFill>
@@ -4497,22 +5490,21 @@
             </a:p>
           </p:txBody>
         </p:sp>
-        <p:sp>
-          <p:nvSpPr>
-            <p:cNvPr id="22" name="正方形/長方形 21"/>
-            <p:cNvSpPr/>
+        <p:cxnSp>
+          <p:nvCxnSpPr>
+            <p:cNvPr id="39" name="直線コネクタ 38"/>
+            <p:cNvCxnSpPr/>
             <p:nvPr/>
-          </p:nvSpPr>
+          </p:nvCxnSpPr>
           <p:spPr>
             <a:xfrm>
-              <a:off x="502671" y="6091778"/>
-              <a:ext cx="8082437" cy="358019"/>
+              <a:off x="2565312" y="4087025"/>
+              <a:ext cx="3161233" cy="0"/>
             </a:xfrm>
-            <a:prstGeom prst="rect">
+            <a:prstGeom prst="line">
               <a:avLst/>
             </a:prstGeom>
-            <a:noFill/>
-            <a:ln w="25400">
+            <a:ln w="19050">
               <a:solidFill>
                 <a:schemeClr val="tx1"/>
               </a:solidFill>
@@ -4520,116 +5512,138 @@
             <a:effectLst/>
           </p:spPr>
           <p:style>
-            <a:lnRef idx="1">
+            <a:lnRef idx="2">
               <a:schemeClr val="accent1"/>
             </a:lnRef>
-            <a:fillRef idx="3">
+            <a:fillRef idx="0">
               <a:schemeClr val="accent1"/>
             </a:fillRef>
-            <a:effectRef idx="2">
+            <a:effectRef idx="1">
               <a:schemeClr val="accent1"/>
             </a:effectRef>
             <a:fontRef idx="minor">
-              <a:schemeClr val="lt1"/>
+              <a:schemeClr val="tx1"/>
             </a:fontRef>
           </p:style>
-          <p:txBody>
-            <a:bodyPr rtlCol="0" anchor="ctr"/>
-            <a:lstStyle/>
-            <a:p>
-              <a:pPr algn="ctr"/>
-              <a:r>
-                <a:rPr kumimoji="1" lang="ja-JP" altLang="en-US" sz="1400" dirty="0" smtClean="0">
-                  <a:solidFill>
-                    <a:srgbClr val="000000"/>
-                  </a:solidFill>
-                  <a:latin typeface="メイリオ"/>
-                  <a:ea typeface="メイリオ"/>
-                  <a:cs typeface="メイリオ"/>
-                </a:rPr>
-                <a:t>メッセージ表示</a:t>
-              </a:r>
-              <a:endParaRPr kumimoji="1" lang="ja-JP" altLang="en-US" sz="1400" dirty="0">
-                <a:solidFill>
-                  <a:srgbClr val="000000"/>
-                </a:solidFill>
-                <a:latin typeface="メイリオ"/>
-                <a:ea typeface="メイリオ"/>
-                <a:cs typeface="メイリオ"/>
-              </a:endParaRPr>
-            </a:p>
-          </p:txBody>
-        </p:sp>
+        </p:cxnSp>
+        <p:cxnSp>
+          <p:nvCxnSpPr>
+            <p:cNvPr id="40" name="直線コネクタ 39"/>
+            <p:cNvCxnSpPr/>
+            <p:nvPr/>
+          </p:nvCxnSpPr>
+          <p:spPr>
+            <a:xfrm>
+              <a:off x="2565312" y="4551152"/>
+              <a:ext cx="3161233" cy="0"/>
+            </a:xfrm>
+            <a:prstGeom prst="line">
+              <a:avLst/>
+            </a:prstGeom>
+            <a:ln w="19050">
+              <a:solidFill>
+                <a:schemeClr val="tx1"/>
+              </a:solidFill>
+            </a:ln>
+            <a:effectLst/>
+          </p:spPr>
+          <p:style>
+            <a:lnRef idx="2">
+              <a:schemeClr val="accent1"/>
+            </a:lnRef>
+            <a:fillRef idx="0">
+              <a:schemeClr val="accent1"/>
+            </a:fillRef>
+            <a:effectRef idx="1">
+              <a:schemeClr val="accent1"/>
+            </a:effectRef>
+            <a:fontRef idx="minor">
+              <a:schemeClr val="tx1"/>
+            </a:fontRef>
+          </p:style>
+        </p:cxnSp>
+        <p:cxnSp>
+          <p:nvCxnSpPr>
+            <p:cNvPr id="41" name="直線コネクタ 40"/>
+            <p:cNvCxnSpPr/>
+            <p:nvPr/>
+          </p:nvCxnSpPr>
+          <p:spPr>
+            <a:xfrm>
+              <a:off x="2565312" y="5015279"/>
+              <a:ext cx="3161233" cy="0"/>
+            </a:xfrm>
+            <a:prstGeom prst="line">
+              <a:avLst/>
+            </a:prstGeom>
+            <a:ln w="19050">
+              <a:solidFill>
+                <a:schemeClr val="tx1"/>
+              </a:solidFill>
+            </a:ln>
+            <a:effectLst/>
+          </p:spPr>
+          <p:style>
+            <a:lnRef idx="2">
+              <a:schemeClr val="accent1"/>
+            </a:lnRef>
+            <a:fillRef idx="0">
+              <a:schemeClr val="accent1"/>
+            </a:fillRef>
+            <a:effectRef idx="1">
+              <a:schemeClr val="accent1"/>
+            </a:effectRef>
+            <a:fontRef idx="minor">
+              <a:schemeClr val="tx1"/>
+            </a:fontRef>
+          </p:style>
+        </p:cxnSp>
+        <p:cxnSp>
+          <p:nvCxnSpPr>
+            <p:cNvPr id="42" name="直線コネクタ 41"/>
+            <p:cNvCxnSpPr/>
+            <p:nvPr/>
+          </p:nvCxnSpPr>
+          <p:spPr>
+            <a:xfrm>
+              <a:off x="2565312" y="5456316"/>
+              <a:ext cx="3161233" cy="0"/>
+            </a:xfrm>
+            <a:prstGeom prst="line">
+              <a:avLst/>
+            </a:prstGeom>
+            <a:ln w="19050">
+              <a:solidFill>
+                <a:schemeClr val="tx1"/>
+              </a:solidFill>
+            </a:ln>
+            <a:effectLst/>
+          </p:spPr>
+          <p:style>
+            <a:lnRef idx="2">
+              <a:schemeClr val="accent1"/>
+            </a:lnRef>
+            <a:fillRef idx="0">
+              <a:schemeClr val="accent1"/>
+            </a:fillRef>
+            <a:effectRef idx="1">
+              <a:schemeClr val="accent1"/>
+            </a:effectRef>
+            <a:fontRef idx="minor">
+              <a:schemeClr val="tx1"/>
+            </a:fontRef>
+          </p:style>
+        </p:cxnSp>
         <p:sp>
           <p:nvSpPr>
-            <p:cNvPr id="4" name="テキスト ボックス 3"/>
-            <p:cNvSpPr txBox="1"/>
-            <p:nvPr/>
-          </p:nvSpPr>
-          <p:spPr>
-            <a:xfrm>
-              <a:off x="6831667" y="1083557"/>
-              <a:ext cx="312906" cy="246221"/>
-            </a:xfrm>
-            <a:prstGeom prst="rect">
-              <a:avLst/>
-            </a:prstGeom>
-            <a:noFill/>
-          </p:spPr>
-          <p:txBody>
-            <a:bodyPr wrap="none" rtlCol="0">
-              <a:spAutoFit/>
-            </a:bodyPr>
-            <a:lstStyle/>
-            <a:p>
-              <a:r>
-                <a:rPr kumimoji="1" lang="en-US" altLang="ja-JP" sz="1000" dirty="0" smtClean="0"/>
-                <a:t>〜</a:t>
-              </a:r>
-              <a:endParaRPr kumimoji="1" lang="ja-JP" altLang="en-US" sz="1000" dirty="0"/>
-            </a:p>
-          </p:txBody>
-        </p:sp>
-        <p:sp>
-          <p:nvSpPr>
-            <p:cNvPr id="24" name="テキスト ボックス 23"/>
-            <p:cNvSpPr txBox="1"/>
-            <p:nvPr/>
-          </p:nvSpPr>
-          <p:spPr>
-            <a:xfrm>
-              <a:off x="1560343" y="1076371"/>
-              <a:ext cx="312906" cy="246221"/>
-            </a:xfrm>
-            <a:prstGeom prst="rect">
-              <a:avLst/>
-            </a:prstGeom>
-            <a:noFill/>
-          </p:spPr>
-          <p:txBody>
-            <a:bodyPr wrap="none" rtlCol="0">
-              <a:spAutoFit/>
-            </a:bodyPr>
-            <a:lstStyle/>
-            <a:p>
-              <a:r>
-                <a:rPr kumimoji="1" lang="en-US" altLang="ja-JP" sz="1000" dirty="0" smtClean="0"/>
-                <a:t>〜</a:t>
-              </a:r>
-              <a:endParaRPr kumimoji="1" lang="ja-JP" altLang="en-US" sz="1000" dirty="0"/>
-            </a:p>
-          </p:txBody>
-        </p:sp>
-        <p:sp>
-          <p:nvSpPr>
-            <p:cNvPr id="25" name="角丸四角形 24"/>
+            <p:cNvPr id="43" name="角丸四角形 42"/>
             <p:cNvSpPr/>
             <p:nvPr/>
           </p:nvSpPr>
           <p:spPr>
             <a:xfrm>
-              <a:off x="1873249" y="1097215"/>
-              <a:ext cx="642786" cy="209606"/>
+              <a:off x="5397186" y="3748547"/>
+              <a:ext cx="213897" cy="209606"/>
             </a:xfrm>
             <a:prstGeom prst="roundRect">
               <a:avLst/>
@@ -4674,123 +5688,14 @@
         </p:sp>
         <p:sp>
           <p:nvSpPr>
-            <p:cNvPr id="26" name="角丸四角形 25"/>
+            <p:cNvPr id="44" name="角丸四角形 43"/>
             <p:cNvSpPr/>
             <p:nvPr/>
           </p:nvSpPr>
           <p:spPr>
             <a:xfrm>
-              <a:off x="3661177" y="1101512"/>
-              <a:ext cx="910482" cy="203703"/>
-            </a:xfrm>
-            <a:prstGeom prst="roundRect">
-              <a:avLst/>
-            </a:prstGeom>
-            <a:noFill/>
-            <a:ln w="25400">
-              <a:solidFill>
-                <a:schemeClr val="tx1"/>
-              </a:solidFill>
-            </a:ln>
-            <a:effectLst/>
-          </p:spPr>
-          <p:style>
-            <a:lnRef idx="1">
-              <a:schemeClr val="accent1"/>
-            </a:lnRef>
-            <a:fillRef idx="3">
-              <a:schemeClr val="accent1"/>
-            </a:fillRef>
-            <a:effectRef idx="2">
-              <a:schemeClr val="accent1"/>
-            </a:effectRef>
-            <a:fontRef idx="minor">
-              <a:schemeClr val="lt1"/>
-            </a:fontRef>
-          </p:style>
-          <p:txBody>
-            <a:bodyPr rtlCol="0" anchor="ctr"/>
-            <a:lstStyle/>
-            <a:p>
-              <a:r>
-                <a:rPr lang="ja-JP" altLang="en-US" sz="800" dirty="0" smtClean="0">
-                  <a:solidFill>
-                    <a:srgbClr val="000000"/>
-                  </a:solidFill>
-                  <a:latin typeface="メイリオ"/>
-                  <a:ea typeface="メイリオ"/>
-                  <a:cs typeface="メイリオ"/>
-                </a:rPr>
-                <a:t>と一致する</a:t>
-              </a:r>
-              <a:endParaRPr kumimoji="1" lang="ja-JP" altLang="en-US" sz="800" dirty="0">
-                <a:solidFill>
-                  <a:srgbClr val="000000"/>
-                </a:solidFill>
-                <a:latin typeface="メイリオ"/>
-                <a:ea typeface="メイリオ"/>
-                <a:cs typeface="メイリオ"/>
-              </a:endParaRPr>
-            </a:p>
-          </p:txBody>
-        </p:sp>
-        <p:sp>
-          <p:nvSpPr>
-            <p:cNvPr id="7" name="二等辺三角形 6"/>
-            <p:cNvSpPr/>
-            <p:nvPr/>
-          </p:nvSpPr>
-          <p:spPr>
-            <a:xfrm flipH="1" flipV="1">
-              <a:off x="4381832" y="1148614"/>
-              <a:ext cx="108000" cy="108000"/>
-            </a:xfrm>
-            <a:prstGeom prst="triangle">
-              <a:avLst/>
-            </a:prstGeom>
-            <a:solidFill>
-              <a:schemeClr val="tx1"/>
-            </a:solidFill>
-            <a:ln>
-              <a:solidFill>
-                <a:schemeClr val="tx1"/>
-              </a:solidFill>
-            </a:ln>
-            <a:effectLst/>
-          </p:spPr>
-          <p:style>
-            <a:lnRef idx="1">
-              <a:schemeClr val="accent1"/>
-            </a:lnRef>
-            <a:fillRef idx="3">
-              <a:schemeClr val="accent1"/>
-            </a:fillRef>
-            <a:effectRef idx="2">
-              <a:schemeClr val="accent1"/>
-            </a:effectRef>
-            <a:fontRef idx="minor">
-              <a:schemeClr val="lt1"/>
-            </a:fontRef>
-          </p:style>
-          <p:txBody>
-            <a:bodyPr rtlCol="0" anchor="ctr"/>
-            <a:lstStyle/>
-            <a:p>
-              <a:pPr algn="ctr"/>
-              <a:endParaRPr kumimoji="1" lang="ja-JP" altLang="en-US"/>
-            </a:p>
-          </p:txBody>
-        </p:sp>
-        <p:sp>
-          <p:nvSpPr>
-            <p:cNvPr id="27" name="角丸四角形 26"/>
-            <p:cNvSpPr/>
-            <p:nvPr/>
-          </p:nvSpPr>
-          <p:spPr>
-            <a:xfrm>
-              <a:off x="6206129" y="1091915"/>
-              <a:ext cx="642786" cy="209606"/>
+              <a:off x="5397186" y="4212675"/>
+              <a:ext cx="213897" cy="209606"/>
             </a:xfrm>
             <a:prstGeom prst="roundRect">
               <a:avLst/>
@@ -4835,14 +5740,14 @@
         </p:sp>
         <p:sp>
           <p:nvSpPr>
-            <p:cNvPr id="28" name="角丸四角形 27"/>
+            <p:cNvPr id="45" name="角丸四角形 44"/>
             <p:cNvSpPr/>
             <p:nvPr/>
           </p:nvSpPr>
           <p:spPr>
             <a:xfrm>
-              <a:off x="7123189" y="1091915"/>
-              <a:ext cx="642786" cy="209606"/>
+              <a:off x="5397186" y="4665257"/>
+              <a:ext cx="213897" cy="209606"/>
             </a:xfrm>
             <a:prstGeom prst="roundRect">
               <a:avLst/>
@@ -4885,11 +5790,463 @@
             </a:p>
           </p:txBody>
         </p:sp>
+        <p:sp>
+          <p:nvSpPr>
+            <p:cNvPr id="46" name="角丸四角形 45"/>
+            <p:cNvSpPr/>
+            <p:nvPr/>
+          </p:nvSpPr>
+          <p:spPr>
+            <a:xfrm>
+              <a:off x="5397186" y="5131168"/>
+              <a:ext cx="213897" cy="209606"/>
+            </a:xfrm>
+            <a:prstGeom prst="roundRect">
+              <a:avLst/>
+            </a:prstGeom>
+            <a:noFill/>
+            <a:ln w="25400">
+              <a:solidFill>
+                <a:schemeClr val="tx1"/>
+              </a:solidFill>
+            </a:ln>
+            <a:effectLst/>
+          </p:spPr>
+          <p:style>
+            <a:lnRef idx="1">
+              <a:schemeClr val="accent1"/>
+            </a:lnRef>
+            <a:fillRef idx="3">
+              <a:schemeClr val="accent1"/>
+            </a:fillRef>
+            <a:effectRef idx="2">
+              <a:schemeClr val="accent1"/>
+            </a:effectRef>
+            <a:fontRef idx="minor">
+              <a:schemeClr val="lt1"/>
+            </a:fontRef>
+          </p:style>
+          <p:txBody>
+            <a:bodyPr rtlCol="0" anchor="ctr"/>
+            <a:lstStyle/>
+            <a:p>
+              <a:pPr algn="ctr"/>
+              <a:endParaRPr kumimoji="1" lang="ja-JP" altLang="en-US" dirty="0">
+                <a:solidFill>
+                  <a:srgbClr val="000000"/>
+                </a:solidFill>
+                <a:latin typeface="メイリオ"/>
+                <a:ea typeface="メイリオ"/>
+                <a:cs typeface="メイリオ"/>
+              </a:endParaRPr>
+            </a:p>
+          </p:txBody>
+        </p:sp>
+        <p:sp>
+          <p:nvSpPr>
+            <p:cNvPr id="47" name="角丸四角形 46"/>
+            <p:cNvSpPr/>
+            <p:nvPr/>
+          </p:nvSpPr>
+          <p:spPr>
+            <a:xfrm>
+              <a:off x="2709404" y="5539353"/>
+              <a:ext cx="1377687" cy="360373"/>
+            </a:xfrm>
+            <a:prstGeom prst="roundRect">
+              <a:avLst/>
+            </a:prstGeom>
+            <a:noFill/>
+            <a:ln w="25400">
+              <a:solidFill>
+                <a:schemeClr val="tx1"/>
+              </a:solidFill>
+            </a:ln>
+            <a:effectLst/>
+          </p:spPr>
+          <p:style>
+            <a:lnRef idx="1">
+              <a:schemeClr val="accent1"/>
+            </a:lnRef>
+            <a:fillRef idx="3">
+              <a:schemeClr val="accent1"/>
+            </a:fillRef>
+            <a:effectRef idx="2">
+              <a:schemeClr val="accent1"/>
+            </a:effectRef>
+            <a:fontRef idx="minor">
+              <a:schemeClr val="lt1"/>
+            </a:fontRef>
+          </p:style>
+          <p:txBody>
+            <a:bodyPr rtlCol="0" anchor="ctr"/>
+            <a:lstStyle/>
+            <a:p>
+              <a:pPr algn="ctr"/>
+              <a:r>
+                <a:rPr lang="ja-JP" altLang="en-US" sz="1600" dirty="0" smtClean="0">
+                  <a:solidFill>
+                    <a:srgbClr val="000000"/>
+                  </a:solidFill>
+                  <a:latin typeface="メイリオ"/>
+                  <a:ea typeface="メイリオ"/>
+                  <a:cs typeface="メイリオ"/>
+                </a:rPr>
+                <a:t>キャンセル</a:t>
+              </a:r>
+              <a:endParaRPr kumimoji="1" lang="ja-JP" altLang="en-US" sz="1600" dirty="0">
+                <a:solidFill>
+                  <a:srgbClr val="000000"/>
+                </a:solidFill>
+                <a:latin typeface="メイリオ"/>
+                <a:ea typeface="メイリオ"/>
+                <a:cs typeface="メイリオ"/>
+              </a:endParaRPr>
+            </a:p>
+          </p:txBody>
+        </p:sp>
+        <p:sp>
+          <p:nvSpPr>
+            <p:cNvPr id="48" name="角丸四角形 47"/>
+            <p:cNvSpPr/>
+            <p:nvPr/>
+          </p:nvSpPr>
+          <p:spPr>
+            <a:xfrm>
+              <a:off x="4198759" y="5539353"/>
+              <a:ext cx="1377687" cy="360373"/>
+            </a:xfrm>
+            <a:prstGeom prst="roundRect">
+              <a:avLst/>
+            </a:prstGeom>
+            <a:noFill/>
+            <a:ln w="25400">
+              <a:solidFill>
+                <a:schemeClr val="tx1"/>
+              </a:solidFill>
+            </a:ln>
+            <a:effectLst/>
+          </p:spPr>
+          <p:style>
+            <a:lnRef idx="1">
+              <a:schemeClr val="accent1"/>
+            </a:lnRef>
+            <a:fillRef idx="3">
+              <a:schemeClr val="accent1"/>
+            </a:fillRef>
+            <a:effectRef idx="2">
+              <a:schemeClr val="accent1"/>
+            </a:effectRef>
+            <a:fontRef idx="minor">
+              <a:schemeClr val="lt1"/>
+            </a:fontRef>
+          </p:style>
+          <p:txBody>
+            <a:bodyPr rtlCol="0" anchor="ctr"/>
+            <a:lstStyle/>
+            <a:p>
+              <a:pPr algn="ctr"/>
+              <a:r>
+                <a:rPr kumimoji="1" lang="en-US" altLang="ja-JP" sz="1600" dirty="0" smtClean="0">
+                  <a:solidFill>
+                    <a:srgbClr val="000000"/>
+                  </a:solidFill>
+                  <a:latin typeface="メイリオ"/>
+                  <a:ea typeface="メイリオ"/>
+                  <a:cs typeface="メイリオ"/>
+                </a:rPr>
+                <a:t>OK</a:t>
+              </a:r>
+              <a:endParaRPr kumimoji="1" lang="ja-JP" altLang="en-US" sz="1600" dirty="0">
+                <a:solidFill>
+                  <a:srgbClr val="000000"/>
+                </a:solidFill>
+                <a:latin typeface="メイリオ"/>
+                <a:ea typeface="メイリオ"/>
+                <a:cs typeface="メイリオ"/>
+              </a:endParaRPr>
+            </a:p>
+          </p:txBody>
+        </p:sp>
+        <p:sp>
+          <p:nvSpPr>
+            <p:cNvPr id="49" name="テキスト ボックス 48"/>
+            <p:cNvSpPr txBox="1"/>
+            <p:nvPr/>
+          </p:nvSpPr>
+          <p:spPr>
+            <a:xfrm>
+              <a:off x="2590364" y="1350881"/>
+              <a:ext cx="1800493" cy="369332"/>
+            </a:xfrm>
+            <a:prstGeom prst="rect">
+              <a:avLst/>
+            </a:prstGeom>
+            <a:noFill/>
+          </p:spPr>
+          <p:txBody>
+            <a:bodyPr wrap="none" rtlCol="0">
+              <a:spAutoFit/>
+            </a:bodyPr>
+            <a:lstStyle/>
+            <a:p>
+              <a:r>
+                <a:rPr kumimoji="1" lang="ja-JP" altLang="en-US" dirty="0" smtClean="0">
+                  <a:latin typeface="メイリオ"/>
+                  <a:ea typeface="メイリオ"/>
+                  <a:cs typeface="メイリオ"/>
+                </a:rPr>
+                <a:t>カテゴリを選択</a:t>
+              </a:r>
+              <a:endParaRPr kumimoji="1" lang="ja-JP" altLang="en-US" dirty="0">
+                <a:latin typeface="メイリオ"/>
+                <a:ea typeface="メイリオ"/>
+                <a:cs typeface="メイリオ"/>
+              </a:endParaRPr>
+            </a:p>
+          </p:txBody>
+        </p:sp>
+        <p:sp>
+          <p:nvSpPr>
+            <p:cNvPr id="50" name="テキスト ボックス 49"/>
+            <p:cNvSpPr txBox="1"/>
+            <p:nvPr/>
+          </p:nvSpPr>
+          <p:spPr>
+            <a:xfrm>
+              <a:off x="2569589" y="1872613"/>
+              <a:ext cx="595035" cy="338554"/>
+            </a:xfrm>
+            <a:prstGeom prst="rect">
+              <a:avLst/>
+            </a:prstGeom>
+            <a:noFill/>
+          </p:spPr>
+          <p:txBody>
+            <a:bodyPr wrap="none" rtlCol="0">
+              <a:spAutoFit/>
+            </a:bodyPr>
+            <a:lstStyle/>
+            <a:p>
+              <a:r>
+                <a:rPr lang="ja-JP" altLang="en-US" sz="1600" dirty="0" smtClean="0">
+                  <a:latin typeface="メイリオ"/>
+                  <a:ea typeface="メイリオ"/>
+                  <a:cs typeface="メイリオ"/>
+                </a:rPr>
+                <a:t>給料</a:t>
+              </a:r>
+              <a:endParaRPr kumimoji="1" lang="ja-JP" altLang="en-US" sz="1600" dirty="0">
+                <a:latin typeface="メイリオ"/>
+                <a:ea typeface="メイリオ"/>
+                <a:cs typeface="メイリオ"/>
+              </a:endParaRPr>
+            </a:p>
+          </p:txBody>
+        </p:sp>
+        <p:sp>
+          <p:nvSpPr>
+            <p:cNvPr id="51" name="テキスト ボックス 50"/>
+            <p:cNvSpPr txBox="1"/>
+            <p:nvPr/>
+          </p:nvSpPr>
+          <p:spPr>
+            <a:xfrm>
+              <a:off x="2570758" y="2325680"/>
+              <a:ext cx="595035" cy="338554"/>
+            </a:xfrm>
+            <a:prstGeom prst="rect">
+              <a:avLst/>
+            </a:prstGeom>
+            <a:noFill/>
+          </p:spPr>
+          <p:txBody>
+            <a:bodyPr wrap="none" rtlCol="0">
+              <a:spAutoFit/>
+            </a:bodyPr>
+            <a:lstStyle/>
+            <a:p>
+              <a:r>
+                <a:rPr lang="ja-JP" altLang="en-US" sz="1600" dirty="0" smtClean="0">
+                  <a:latin typeface="メイリオ"/>
+                  <a:ea typeface="メイリオ"/>
+                  <a:cs typeface="メイリオ"/>
+                </a:rPr>
+                <a:t>食費</a:t>
+              </a:r>
+              <a:endParaRPr kumimoji="1" lang="ja-JP" altLang="en-US" sz="1600" dirty="0">
+                <a:latin typeface="メイリオ"/>
+                <a:ea typeface="メイリオ"/>
+                <a:cs typeface="メイリオ"/>
+              </a:endParaRPr>
+            </a:p>
+          </p:txBody>
+        </p:sp>
+        <p:sp>
+          <p:nvSpPr>
+            <p:cNvPr id="52" name="テキスト ボックス 51"/>
+            <p:cNvSpPr txBox="1"/>
+            <p:nvPr/>
+          </p:nvSpPr>
+          <p:spPr>
+            <a:xfrm>
+              <a:off x="2570758" y="2781999"/>
+              <a:ext cx="800219" cy="338554"/>
+            </a:xfrm>
+            <a:prstGeom prst="rect">
+              <a:avLst/>
+            </a:prstGeom>
+            <a:noFill/>
+          </p:spPr>
+          <p:txBody>
+            <a:bodyPr wrap="none" rtlCol="0">
+              <a:spAutoFit/>
+            </a:bodyPr>
+            <a:lstStyle/>
+            <a:p>
+              <a:r>
+                <a:rPr lang="ja-JP" altLang="en-US" sz="1600" dirty="0" smtClean="0">
+                  <a:latin typeface="メイリオ"/>
+                  <a:ea typeface="メイリオ"/>
+                  <a:cs typeface="メイリオ"/>
+                </a:rPr>
+                <a:t>交通費</a:t>
+              </a:r>
+              <a:endParaRPr kumimoji="1" lang="ja-JP" altLang="en-US" sz="1600" dirty="0">
+                <a:latin typeface="メイリオ"/>
+                <a:ea typeface="メイリオ"/>
+                <a:cs typeface="メイリオ"/>
+              </a:endParaRPr>
+            </a:p>
+          </p:txBody>
+        </p:sp>
+        <p:sp>
+          <p:nvSpPr>
+            <p:cNvPr id="53" name="テキスト ボックス 52"/>
+            <p:cNvSpPr txBox="1"/>
+            <p:nvPr/>
+          </p:nvSpPr>
+          <p:spPr>
+            <a:xfrm>
+              <a:off x="2578819" y="3226773"/>
+              <a:ext cx="1210588" cy="338554"/>
+            </a:xfrm>
+            <a:prstGeom prst="rect">
+              <a:avLst/>
+            </a:prstGeom>
+            <a:noFill/>
+          </p:spPr>
+          <p:txBody>
+            <a:bodyPr wrap="none" rtlCol="0">
+              <a:spAutoFit/>
+            </a:bodyPr>
+            <a:lstStyle/>
+            <a:p>
+              <a:r>
+                <a:rPr lang="ja-JP" altLang="en-US" sz="1600" dirty="0" smtClean="0">
+                  <a:latin typeface="メイリオ"/>
+                  <a:ea typeface="メイリオ"/>
+                  <a:cs typeface="メイリオ"/>
+                </a:rPr>
+                <a:t>水道光熱費</a:t>
+              </a:r>
+              <a:endParaRPr kumimoji="1" lang="ja-JP" altLang="en-US" sz="1600" dirty="0">
+                <a:latin typeface="メイリオ"/>
+                <a:ea typeface="メイリオ"/>
+                <a:cs typeface="メイリオ"/>
+              </a:endParaRPr>
+            </a:p>
+          </p:txBody>
+        </p:sp>
+        <p:sp>
+          <p:nvSpPr>
+            <p:cNvPr id="54" name="テキスト ボックス 53"/>
+            <p:cNvSpPr txBox="1"/>
+            <p:nvPr/>
+          </p:nvSpPr>
+          <p:spPr>
+            <a:xfrm>
+              <a:off x="2569589" y="3694637"/>
+              <a:ext cx="800219" cy="338554"/>
+            </a:xfrm>
+            <a:prstGeom prst="rect">
+              <a:avLst/>
+            </a:prstGeom>
+            <a:noFill/>
+          </p:spPr>
+          <p:txBody>
+            <a:bodyPr wrap="none" rtlCol="0">
+              <a:spAutoFit/>
+            </a:bodyPr>
+            <a:lstStyle/>
+            <a:p>
+              <a:r>
+                <a:rPr lang="ja-JP" altLang="en-US" sz="1600" dirty="0" smtClean="0">
+                  <a:latin typeface="メイリオ"/>
+                  <a:ea typeface="メイリオ"/>
+                  <a:cs typeface="メイリオ"/>
+                </a:rPr>
+                <a:t>被服費</a:t>
+              </a:r>
+              <a:endParaRPr kumimoji="1" lang="ja-JP" altLang="en-US" sz="1600" dirty="0">
+                <a:latin typeface="メイリオ"/>
+                <a:ea typeface="メイリオ"/>
+                <a:cs typeface="メイリオ"/>
+              </a:endParaRPr>
+            </a:p>
+          </p:txBody>
+        </p:sp>
+        <p:sp>
+          <p:nvSpPr>
+            <p:cNvPr id="55" name="テキスト ボックス 54"/>
+            <p:cNvSpPr txBox="1"/>
+            <p:nvPr/>
+          </p:nvSpPr>
+          <p:spPr>
+            <a:xfrm>
+              <a:off x="2565312" y="4150956"/>
+              <a:ext cx="607859" cy="338554"/>
+            </a:xfrm>
+            <a:prstGeom prst="rect">
+              <a:avLst/>
+            </a:prstGeom>
+            <a:noFill/>
+          </p:spPr>
+          <p:txBody>
+            <a:bodyPr wrap="none" rtlCol="0">
+              <a:spAutoFit/>
+            </a:bodyPr>
+            <a:lstStyle/>
+            <a:p>
+              <a:r>
+                <a:rPr lang="en-US" altLang="ja-JP" sz="1600" dirty="0" smtClean="0">
+                  <a:latin typeface="メイリオ"/>
+                  <a:ea typeface="メイリオ"/>
+                  <a:cs typeface="メイリオ"/>
+                </a:rPr>
+                <a:t>…</a:t>
+              </a:r>
+              <a:r>
+                <a:rPr lang="ja-JP" altLang="en-US" sz="1600" dirty="0" smtClean="0">
+                  <a:latin typeface="メイリオ"/>
+                  <a:ea typeface="メイリオ"/>
+                  <a:cs typeface="メイリオ"/>
+                </a:rPr>
+                <a:t>費</a:t>
+              </a:r>
+              <a:endParaRPr kumimoji="1" lang="ja-JP" altLang="en-US" sz="1600" dirty="0">
+                <a:latin typeface="メイリオ"/>
+                <a:ea typeface="メイリオ"/>
+                <a:cs typeface="メイリオ"/>
+              </a:endParaRPr>
+            </a:p>
+          </p:txBody>
+        </p:sp>
       </p:grpSp>
     </p:spTree>
     <p:extLst>
       <p:ext uri="{BB962C8B-B14F-4D97-AF65-F5344CB8AC3E}">
-        <p14:creationId xmlns:p14="http://schemas.microsoft.com/office/powerpoint/2010/main" val="3661719748"/>
+        <p14:creationId xmlns:p14="http://schemas.microsoft.com/office/powerpoint/2010/main" val="1323725066"/>
       </p:ext>
     </p:extLst>
   </p:cSld>

</xml_diff>